<commit_message>
Docs: Add explanation for inline hints
</commit_message>
<xml_diff>
--- a/docs/diagrams/UserGuideTemplate.pptx
+++ b/docs/diagrams/UserGuideTemplate.pptx
@@ -27,6 +27,11 @@
     <p:sldId id="277" r:id="rId21"/>
     <p:sldId id="270" r:id="rId22"/>
     <p:sldId id="271" r:id="rId23"/>
+    <p:sldId id="278" r:id="rId24"/>
+    <p:sldId id="280" r:id="rId25"/>
+    <p:sldId id="279" r:id="rId26"/>
+    <p:sldId id="282" r:id="rId27"/>
+    <p:sldId id="281" r:id="rId28"/>
   </p:sldIdLst>
   <p:sldSz cx="12912725" cy="6858000"/>
   <p:notesSz cx="6858000" cy="9144000"/>
@@ -268,7 +273,7 @@
           <a:p>
             <a:fld id="{A6B1CE76-FF81-484F-AC4F-23D3B86EA688}" type="datetimeFigureOut">
               <a:rPr lang="en-SG" smtClean="0"/>
-              <a:t>25/10/2017</a:t>
+              <a:t>13/11/2017</a:t>
             </a:fld>
             <a:endParaRPr lang="en-SG"/>
           </a:p>
@@ -438,7 +443,7 @@
           <a:p>
             <a:fld id="{A6B1CE76-FF81-484F-AC4F-23D3B86EA688}" type="datetimeFigureOut">
               <a:rPr lang="en-SG" smtClean="0"/>
-              <a:t>25/10/2017</a:t>
+              <a:t>13/11/2017</a:t>
             </a:fld>
             <a:endParaRPr lang="en-SG"/>
           </a:p>
@@ -618,7 +623,7 @@
           <a:p>
             <a:fld id="{A6B1CE76-FF81-484F-AC4F-23D3B86EA688}" type="datetimeFigureOut">
               <a:rPr lang="en-SG" smtClean="0"/>
-              <a:t>25/10/2017</a:t>
+              <a:t>13/11/2017</a:t>
             </a:fld>
             <a:endParaRPr lang="en-SG"/>
           </a:p>
@@ -788,7 +793,7 @@
           <a:p>
             <a:fld id="{A6B1CE76-FF81-484F-AC4F-23D3B86EA688}" type="datetimeFigureOut">
               <a:rPr lang="en-SG" smtClean="0"/>
-              <a:t>25/10/2017</a:t>
+              <a:t>13/11/2017</a:t>
             </a:fld>
             <a:endParaRPr lang="en-SG"/>
           </a:p>
@@ -1034,7 +1039,7 @@
           <a:p>
             <a:fld id="{A6B1CE76-FF81-484F-AC4F-23D3B86EA688}" type="datetimeFigureOut">
               <a:rPr lang="en-SG" smtClean="0"/>
-              <a:t>25/10/2017</a:t>
+              <a:t>13/11/2017</a:t>
             </a:fld>
             <a:endParaRPr lang="en-SG"/>
           </a:p>
@@ -1266,7 +1271,7 @@
           <a:p>
             <a:fld id="{A6B1CE76-FF81-484F-AC4F-23D3B86EA688}" type="datetimeFigureOut">
               <a:rPr lang="en-SG" smtClean="0"/>
-              <a:t>25/10/2017</a:t>
+              <a:t>13/11/2017</a:t>
             </a:fld>
             <a:endParaRPr lang="en-SG"/>
           </a:p>
@@ -1633,7 +1638,7 @@
           <a:p>
             <a:fld id="{A6B1CE76-FF81-484F-AC4F-23D3B86EA688}" type="datetimeFigureOut">
               <a:rPr lang="en-SG" smtClean="0"/>
-              <a:t>25/10/2017</a:t>
+              <a:t>13/11/2017</a:t>
             </a:fld>
             <a:endParaRPr lang="en-SG"/>
           </a:p>
@@ -1751,7 +1756,7 @@
           <a:p>
             <a:fld id="{A6B1CE76-FF81-484F-AC4F-23D3B86EA688}" type="datetimeFigureOut">
               <a:rPr lang="en-SG" smtClean="0"/>
-              <a:t>25/10/2017</a:t>
+              <a:t>13/11/2017</a:t>
             </a:fld>
             <a:endParaRPr lang="en-SG"/>
           </a:p>
@@ -1846,7 +1851,7 @@
           <a:p>
             <a:fld id="{A6B1CE76-FF81-484F-AC4F-23D3B86EA688}" type="datetimeFigureOut">
               <a:rPr lang="en-SG" smtClean="0"/>
-              <a:t>25/10/2017</a:t>
+              <a:t>13/11/2017</a:t>
             </a:fld>
             <a:endParaRPr lang="en-SG"/>
           </a:p>
@@ -2123,7 +2128,7 @@
           <a:p>
             <a:fld id="{A6B1CE76-FF81-484F-AC4F-23D3B86EA688}" type="datetimeFigureOut">
               <a:rPr lang="en-SG" smtClean="0"/>
-              <a:t>25/10/2017</a:t>
+              <a:t>13/11/2017</a:t>
             </a:fld>
             <a:endParaRPr lang="en-SG"/>
           </a:p>
@@ -2380,7 +2385,7 @@
           <a:p>
             <a:fld id="{A6B1CE76-FF81-484F-AC4F-23D3B86EA688}" type="datetimeFigureOut">
               <a:rPr lang="en-SG" smtClean="0"/>
-              <a:t>25/10/2017</a:t>
+              <a:t>13/11/2017</a:t>
             </a:fld>
             <a:endParaRPr lang="en-SG"/>
           </a:p>
@@ -2593,7 +2598,7 @@
           <a:p>
             <a:fld id="{A6B1CE76-FF81-484F-AC4F-23D3B86EA688}" type="datetimeFigureOut">
               <a:rPr lang="en-SG" smtClean="0"/>
-              <a:t>25/10/2017</a:t>
+              <a:t>13/11/2017</a:t>
             </a:fld>
             <a:endParaRPr lang="en-SG"/>
           </a:p>
@@ -7829,6 +7834,1930 @@
 </p:sld>
 </file>
 
+<file path=ppt/slides/slide23.xml><?xml version="1.0" encoding="utf-8"?>
+<p:sld xmlns:a="http://schemas.openxmlformats.org/drawingml/2006/main" xmlns:r="http://schemas.openxmlformats.org/officeDocument/2006/relationships" xmlns:p="http://schemas.openxmlformats.org/presentationml/2006/main">
+  <p:cSld>
+    <p:spTree>
+      <p:nvGrpSpPr>
+        <p:cNvPr id="1" name=""/>
+        <p:cNvGrpSpPr/>
+        <p:nvPr/>
+      </p:nvGrpSpPr>
+      <p:grpSpPr>
+        <a:xfrm>
+          <a:off x="0" y="0"/>
+          <a:ext cx="0" cy="0"/>
+          <a:chOff x="0" y="0"/>
+          <a:chExt cx="0" cy="0"/>
+        </a:xfrm>
+      </p:grpSpPr>
+      <p:pic>
+        <p:nvPicPr>
+          <p:cNvPr id="4" name="Picture 3">
+            <a:extLst>
+              <a:ext uri="{FF2B5EF4-FFF2-40B4-BE49-F238E27FC236}">
+                <a16:creationId xmlns:a16="http://schemas.microsoft.com/office/drawing/2014/main" id="{0EA7D362-5B44-4552-B4E2-4EFF29FCF9C8}"/>
+              </a:ext>
+            </a:extLst>
+          </p:cNvPr>
+          <p:cNvPicPr>
+            <a:picLocks noChangeAspect="1"/>
+          </p:cNvPicPr>
+          <p:nvPr/>
+        </p:nvPicPr>
+        <p:blipFill>
+          <a:blip r:embed="rId2"/>
+          <a:stretch>
+            <a:fillRect/>
+          </a:stretch>
+        </p:blipFill>
+        <p:spPr>
+          <a:xfrm>
+            <a:off x="2879724" y="590550"/>
+            <a:ext cx="7153275" cy="5676900"/>
+          </a:xfrm>
+          <a:prstGeom prst="rect">
+            <a:avLst/>
+          </a:prstGeom>
+        </p:spPr>
+      </p:pic>
+      <p:cxnSp>
+        <p:nvCxnSpPr>
+          <p:cNvPr id="5" name="Straight Arrow Connector 4">
+            <a:extLst>
+              <a:ext uri="{FF2B5EF4-FFF2-40B4-BE49-F238E27FC236}">
+                <a16:creationId xmlns:a16="http://schemas.microsoft.com/office/drawing/2014/main" id="{F39DB7E0-05E0-42DE-B6C8-954C192DD19B}"/>
+              </a:ext>
+            </a:extLst>
+          </p:cNvPr>
+          <p:cNvCxnSpPr>
+            <a:cxnSpLocks/>
+          </p:cNvCxnSpPr>
+          <p:nvPr/>
+        </p:nvCxnSpPr>
+        <p:spPr>
+          <a:xfrm flipH="1">
+            <a:off x="2590800" y="1721273"/>
+            <a:ext cx="1151467" cy="0"/>
+          </a:xfrm>
+          <a:prstGeom prst="straightConnector1">
+            <a:avLst/>
+          </a:prstGeom>
+          <a:ln w="38100">
+            <a:solidFill>
+              <a:srgbClr val="F2951A"/>
+            </a:solidFill>
+            <a:tailEnd type="triangle"/>
+          </a:ln>
+        </p:spPr>
+        <p:style>
+          <a:lnRef idx="1">
+            <a:schemeClr val="accent1"/>
+          </a:lnRef>
+          <a:fillRef idx="0">
+            <a:schemeClr val="accent1"/>
+          </a:fillRef>
+          <a:effectRef idx="0">
+            <a:schemeClr val="accent1"/>
+          </a:effectRef>
+          <a:fontRef idx="minor">
+            <a:schemeClr val="tx1"/>
+          </a:fontRef>
+        </p:style>
+      </p:cxnSp>
+      <p:sp>
+        <p:nvSpPr>
+          <p:cNvPr id="6" name="Rectangle: Rounded Corners 5">
+            <a:extLst>
+              <a:ext uri="{FF2B5EF4-FFF2-40B4-BE49-F238E27FC236}">
+                <a16:creationId xmlns:a16="http://schemas.microsoft.com/office/drawing/2014/main" id="{7D0EAEFC-117A-4D43-9CE7-9A5EC2E3AFAB}"/>
+              </a:ext>
+            </a:extLst>
+          </p:cNvPr>
+          <p:cNvSpPr/>
+          <p:nvPr/>
+        </p:nvSpPr>
+        <p:spPr>
+          <a:xfrm>
+            <a:off x="1236133" y="1583267"/>
+            <a:ext cx="1345672" cy="400657"/>
+          </a:xfrm>
+          <a:prstGeom prst="roundRect">
+            <a:avLst/>
+          </a:prstGeom>
+          <a:solidFill>
+            <a:srgbClr val="F2951A"/>
+          </a:solidFill>
+          <a:ln w="31750">
+            <a:solidFill>
+              <a:srgbClr val="F2951A"/>
+            </a:solidFill>
+          </a:ln>
+        </p:spPr>
+        <p:style>
+          <a:lnRef idx="2">
+            <a:schemeClr val="accent1">
+              <a:shade val="50000"/>
+            </a:schemeClr>
+          </a:lnRef>
+          <a:fillRef idx="1">
+            <a:schemeClr val="accent1"/>
+          </a:fillRef>
+          <a:effectRef idx="0">
+            <a:schemeClr val="accent1"/>
+          </a:effectRef>
+          <a:fontRef idx="minor">
+            <a:schemeClr val="lt1"/>
+          </a:fontRef>
+        </p:style>
+        <p:txBody>
+          <a:bodyPr rtlCol="0" anchor="ctr"/>
+          <a:lstStyle/>
+          <a:p>
+            <a:pPr algn="ctr"/>
+            <a:r>
+              <a:rPr lang="en-SG" sz="1200" dirty="0">
+                <a:latin typeface="Segoe UI" panose="020B0502040204020203" pitchFamily="34" charset="0"/>
+                <a:cs typeface="Segoe UI" panose="020B0502040204020203" pitchFamily="34" charset="0"/>
+              </a:rPr>
+              <a:t>Argument Hint</a:t>
+            </a:r>
+          </a:p>
+        </p:txBody>
+      </p:sp>
+      <p:sp>
+        <p:nvSpPr>
+          <p:cNvPr id="7" name="Rectangle: Rounded Corners 6">
+            <a:extLst>
+              <a:ext uri="{FF2B5EF4-FFF2-40B4-BE49-F238E27FC236}">
+                <a16:creationId xmlns:a16="http://schemas.microsoft.com/office/drawing/2014/main" id="{D0BA3D52-0F82-438D-9144-E4D81C7FECDA}"/>
+              </a:ext>
+            </a:extLst>
+          </p:cNvPr>
+          <p:cNvSpPr/>
+          <p:nvPr/>
+        </p:nvSpPr>
+        <p:spPr>
+          <a:xfrm>
+            <a:off x="3742267" y="1218353"/>
+            <a:ext cx="270933" cy="579120"/>
+          </a:xfrm>
+          <a:prstGeom prst="roundRect">
+            <a:avLst>
+              <a:gd name="adj" fmla="val 26901"/>
+            </a:avLst>
+          </a:prstGeom>
+          <a:solidFill>
+            <a:schemeClr val="bg1">
+              <a:alpha val="18000"/>
+            </a:schemeClr>
+          </a:solidFill>
+          <a:ln w="19050">
+            <a:solidFill>
+              <a:srgbClr val="F2951A"/>
+            </a:solidFill>
+          </a:ln>
+        </p:spPr>
+        <p:style>
+          <a:lnRef idx="2">
+            <a:schemeClr val="accent1">
+              <a:shade val="50000"/>
+            </a:schemeClr>
+          </a:lnRef>
+          <a:fillRef idx="1">
+            <a:schemeClr val="accent1"/>
+          </a:fillRef>
+          <a:effectRef idx="0">
+            <a:schemeClr val="accent1"/>
+          </a:effectRef>
+          <a:fontRef idx="minor">
+            <a:schemeClr val="lt1"/>
+          </a:fontRef>
+        </p:style>
+        <p:txBody>
+          <a:bodyPr rtlCol="0" anchor="ctr"/>
+          <a:lstStyle/>
+          <a:p>
+            <a:pPr algn="ctr"/>
+            <a:endParaRPr lang="en-SG"/>
+          </a:p>
+        </p:txBody>
+      </p:sp>
+      <p:sp>
+        <p:nvSpPr>
+          <p:cNvPr id="10" name="Rectangle: Rounded Corners 9">
+            <a:extLst>
+              <a:ext uri="{FF2B5EF4-FFF2-40B4-BE49-F238E27FC236}">
+                <a16:creationId xmlns:a16="http://schemas.microsoft.com/office/drawing/2014/main" id="{E446566A-4528-44D0-9B07-84E8D668C950}"/>
+              </a:ext>
+            </a:extLst>
+          </p:cNvPr>
+          <p:cNvSpPr/>
+          <p:nvPr/>
+        </p:nvSpPr>
+        <p:spPr>
+          <a:xfrm>
+            <a:off x="4031191" y="1218353"/>
+            <a:ext cx="844552" cy="579120"/>
+          </a:xfrm>
+          <a:prstGeom prst="roundRect">
+            <a:avLst>
+              <a:gd name="adj" fmla="val 26901"/>
+            </a:avLst>
+          </a:prstGeom>
+          <a:solidFill>
+            <a:schemeClr val="bg1">
+              <a:alpha val="18000"/>
+            </a:schemeClr>
+          </a:solidFill>
+          <a:ln w="19050">
+            <a:solidFill>
+              <a:srgbClr val="F2951A"/>
+            </a:solidFill>
+          </a:ln>
+        </p:spPr>
+        <p:style>
+          <a:lnRef idx="2">
+            <a:schemeClr val="accent1">
+              <a:shade val="50000"/>
+            </a:schemeClr>
+          </a:lnRef>
+          <a:fillRef idx="1">
+            <a:schemeClr val="accent1"/>
+          </a:fillRef>
+          <a:effectRef idx="0">
+            <a:schemeClr val="accent1"/>
+          </a:effectRef>
+          <a:fontRef idx="minor">
+            <a:schemeClr val="lt1"/>
+          </a:fontRef>
+        </p:style>
+        <p:txBody>
+          <a:bodyPr rtlCol="0" anchor="ctr"/>
+          <a:lstStyle/>
+          <a:p>
+            <a:pPr algn="ctr"/>
+            <a:endParaRPr lang="en-SG"/>
+          </a:p>
+        </p:txBody>
+      </p:sp>
+      <p:cxnSp>
+        <p:nvCxnSpPr>
+          <p:cNvPr id="11" name="Straight Arrow Connector 10">
+            <a:extLst>
+              <a:ext uri="{FF2B5EF4-FFF2-40B4-BE49-F238E27FC236}">
+                <a16:creationId xmlns:a16="http://schemas.microsoft.com/office/drawing/2014/main" id="{C82E35C4-363C-4591-ADD9-D46B709EA289}"/>
+              </a:ext>
+            </a:extLst>
+          </p:cNvPr>
+          <p:cNvCxnSpPr>
+            <a:cxnSpLocks/>
+          </p:cNvCxnSpPr>
+          <p:nvPr/>
+        </p:nvCxnSpPr>
+        <p:spPr>
+          <a:xfrm>
+            <a:off x="4875743" y="1721273"/>
+            <a:ext cx="1059390" cy="0"/>
+          </a:xfrm>
+          <a:prstGeom prst="straightConnector1">
+            <a:avLst/>
+          </a:prstGeom>
+          <a:ln w="38100">
+            <a:solidFill>
+              <a:srgbClr val="F2951A"/>
+            </a:solidFill>
+            <a:tailEnd type="triangle"/>
+          </a:ln>
+        </p:spPr>
+        <p:style>
+          <a:lnRef idx="1">
+            <a:schemeClr val="accent1"/>
+          </a:lnRef>
+          <a:fillRef idx="0">
+            <a:schemeClr val="accent1"/>
+          </a:fillRef>
+          <a:effectRef idx="0">
+            <a:schemeClr val="accent1"/>
+          </a:effectRef>
+          <a:fontRef idx="minor">
+            <a:schemeClr val="tx1"/>
+          </a:fontRef>
+        </p:style>
+      </p:cxnSp>
+      <p:sp>
+        <p:nvSpPr>
+          <p:cNvPr id="14" name="Rectangle: Rounded Corners 13">
+            <a:extLst>
+              <a:ext uri="{FF2B5EF4-FFF2-40B4-BE49-F238E27FC236}">
+                <a16:creationId xmlns:a16="http://schemas.microsoft.com/office/drawing/2014/main" id="{18BCA40D-91BD-4B8E-9B16-0F01EEBE0BAB}"/>
+              </a:ext>
+            </a:extLst>
+          </p:cNvPr>
+          <p:cNvSpPr/>
+          <p:nvPr/>
+        </p:nvSpPr>
+        <p:spPr>
+          <a:xfrm>
+            <a:off x="5935133" y="1551852"/>
+            <a:ext cx="1159934" cy="338841"/>
+          </a:xfrm>
+          <a:prstGeom prst="roundRect">
+            <a:avLst/>
+          </a:prstGeom>
+          <a:solidFill>
+            <a:srgbClr val="F2951A"/>
+          </a:solidFill>
+          <a:ln w="31750">
+            <a:solidFill>
+              <a:srgbClr val="F2951A"/>
+            </a:solidFill>
+          </a:ln>
+        </p:spPr>
+        <p:style>
+          <a:lnRef idx="2">
+            <a:schemeClr val="accent1">
+              <a:shade val="50000"/>
+            </a:schemeClr>
+          </a:lnRef>
+          <a:fillRef idx="1">
+            <a:schemeClr val="accent1"/>
+          </a:fillRef>
+          <a:effectRef idx="0">
+            <a:schemeClr val="accent1"/>
+          </a:effectRef>
+          <a:fontRef idx="minor">
+            <a:schemeClr val="lt1"/>
+          </a:fontRef>
+        </p:style>
+        <p:txBody>
+          <a:bodyPr rtlCol="0" anchor="ctr"/>
+          <a:lstStyle/>
+          <a:p>
+            <a:pPr algn="ctr"/>
+            <a:r>
+              <a:rPr lang="en-SG" sz="1200" dirty="0">
+                <a:latin typeface="Segoe UI" panose="020B0502040204020203" pitchFamily="34" charset="0"/>
+                <a:cs typeface="Segoe UI" panose="020B0502040204020203" pitchFamily="34" charset="0"/>
+              </a:rPr>
+              <a:t>Description</a:t>
+            </a:r>
+          </a:p>
+        </p:txBody>
+      </p:sp>
+    </p:spTree>
+    <p:extLst>
+      <p:ext uri="{BB962C8B-B14F-4D97-AF65-F5344CB8AC3E}">
+        <p14:creationId xmlns:p14="http://schemas.microsoft.com/office/powerpoint/2010/main" val="2851924992"/>
+      </p:ext>
+    </p:extLst>
+  </p:cSld>
+  <p:clrMapOvr>
+    <a:masterClrMapping/>
+  </p:clrMapOvr>
+</p:sld>
+</file>
+
+<file path=ppt/slides/slide24.xml><?xml version="1.0" encoding="utf-8"?>
+<p:sld xmlns:a="http://schemas.openxmlformats.org/drawingml/2006/main" xmlns:r="http://schemas.openxmlformats.org/officeDocument/2006/relationships" xmlns:p="http://schemas.openxmlformats.org/presentationml/2006/main">
+  <p:cSld>
+    <p:spTree>
+      <p:nvGrpSpPr>
+        <p:cNvPr id="1" name=""/>
+        <p:cNvGrpSpPr/>
+        <p:nvPr/>
+      </p:nvGrpSpPr>
+      <p:grpSpPr>
+        <a:xfrm>
+          <a:off x="0" y="0"/>
+          <a:ext cx="0" cy="0"/>
+          <a:chOff x="0" y="0"/>
+          <a:chExt cx="0" cy="0"/>
+        </a:xfrm>
+      </p:grpSpPr>
+      <p:pic>
+        <p:nvPicPr>
+          <p:cNvPr id="4" name="Picture 3">
+            <a:extLst>
+              <a:ext uri="{FF2B5EF4-FFF2-40B4-BE49-F238E27FC236}">
+                <a16:creationId xmlns:a16="http://schemas.microsoft.com/office/drawing/2014/main" id="{0EA7D362-5B44-4552-B4E2-4EFF29FCF9C8}"/>
+              </a:ext>
+            </a:extLst>
+          </p:cNvPr>
+          <p:cNvPicPr>
+            <a:picLocks noChangeAspect="1"/>
+          </p:cNvPicPr>
+          <p:nvPr/>
+        </p:nvPicPr>
+        <p:blipFill>
+          <a:blip r:embed="rId2"/>
+          <a:stretch>
+            <a:fillRect/>
+          </a:stretch>
+        </p:blipFill>
+        <p:spPr>
+          <a:xfrm>
+            <a:off x="2879724" y="590550"/>
+            <a:ext cx="7153275" cy="5676900"/>
+          </a:xfrm>
+          <a:prstGeom prst="rect">
+            <a:avLst/>
+          </a:prstGeom>
+        </p:spPr>
+      </p:pic>
+      <p:cxnSp>
+        <p:nvCxnSpPr>
+          <p:cNvPr id="5" name="Straight Arrow Connector 4">
+            <a:extLst>
+              <a:ext uri="{FF2B5EF4-FFF2-40B4-BE49-F238E27FC236}">
+                <a16:creationId xmlns:a16="http://schemas.microsoft.com/office/drawing/2014/main" id="{F39DB7E0-05E0-42DE-B6C8-954C192DD19B}"/>
+              </a:ext>
+            </a:extLst>
+          </p:cNvPr>
+          <p:cNvCxnSpPr>
+            <a:cxnSpLocks/>
+          </p:cNvCxnSpPr>
+          <p:nvPr/>
+        </p:nvCxnSpPr>
+        <p:spPr>
+          <a:xfrm flipH="1">
+            <a:off x="1907114" y="1472167"/>
+            <a:ext cx="1151467" cy="0"/>
+          </a:xfrm>
+          <a:prstGeom prst="straightConnector1">
+            <a:avLst/>
+          </a:prstGeom>
+          <a:ln w="38100">
+            <a:solidFill>
+              <a:srgbClr val="F2951A"/>
+            </a:solidFill>
+            <a:tailEnd type="triangle"/>
+          </a:ln>
+        </p:spPr>
+        <p:style>
+          <a:lnRef idx="1">
+            <a:schemeClr val="accent1"/>
+          </a:lnRef>
+          <a:fillRef idx="0">
+            <a:schemeClr val="accent1"/>
+          </a:fillRef>
+          <a:effectRef idx="0">
+            <a:schemeClr val="accent1"/>
+          </a:effectRef>
+          <a:fontRef idx="minor">
+            <a:schemeClr val="tx1"/>
+          </a:fontRef>
+        </p:style>
+      </p:cxnSp>
+      <p:sp>
+        <p:nvSpPr>
+          <p:cNvPr id="6" name="Rectangle: Rounded Corners 5">
+            <a:extLst>
+              <a:ext uri="{FF2B5EF4-FFF2-40B4-BE49-F238E27FC236}">
+                <a16:creationId xmlns:a16="http://schemas.microsoft.com/office/drawing/2014/main" id="{7D0EAEFC-117A-4D43-9CE7-9A5EC2E3AFAB}"/>
+              </a:ext>
+            </a:extLst>
+          </p:cNvPr>
+          <p:cNvSpPr/>
+          <p:nvPr/>
+        </p:nvSpPr>
+        <p:spPr>
+          <a:xfrm>
+            <a:off x="179775" y="1218353"/>
+            <a:ext cx="1727339" cy="511758"/>
+          </a:xfrm>
+          <a:prstGeom prst="roundRect">
+            <a:avLst/>
+          </a:prstGeom>
+          <a:solidFill>
+            <a:srgbClr val="F2951A"/>
+          </a:solidFill>
+          <a:ln w="31750">
+            <a:solidFill>
+              <a:srgbClr val="F2951A"/>
+            </a:solidFill>
+          </a:ln>
+        </p:spPr>
+        <p:style>
+          <a:lnRef idx="2">
+            <a:schemeClr val="accent1">
+              <a:shade val="50000"/>
+            </a:schemeClr>
+          </a:lnRef>
+          <a:fillRef idx="1">
+            <a:schemeClr val="accent1"/>
+          </a:fillRef>
+          <a:effectRef idx="0">
+            <a:schemeClr val="accent1"/>
+          </a:effectRef>
+          <a:fontRef idx="minor">
+            <a:schemeClr val="lt1"/>
+          </a:fontRef>
+        </p:style>
+        <p:txBody>
+          <a:bodyPr rtlCol="0" anchor="ctr"/>
+          <a:lstStyle/>
+          <a:p>
+            <a:pPr algn="ctr"/>
+            <a:r>
+              <a:rPr lang="en-SG" sz="1200" dirty="0" err="1">
+                <a:latin typeface="Segoe UI" panose="020B0502040204020203" pitchFamily="34" charset="0"/>
+                <a:cs typeface="Segoe UI" panose="020B0502040204020203" pitchFamily="34" charset="0"/>
+              </a:rPr>
+              <a:t>CommandTextField</a:t>
+            </a:r>
+            <a:endParaRPr lang="en-SG" sz="1200" dirty="0">
+              <a:latin typeface="Segoe UI" panose="020B0502040204020203" pitchFamily="34" charset="0"/>
+              <a:cs typeface="Segoe UI" panose="020B0502040204020203" pitchFamily="34" charset="0"/>
+            </a:endParaRPr>
+          </a:p>
+        </p:txBody>
+      </p:sp>
+      <p:sp>
+        <p:nvSpPr>
+          <p:cNvPr id="7" name="Rectangle: Rounded Corners 6">
+            <a:extLst>
+              <a:ext uri="{FF2B5EF4-FFF2-40B4-BE49-F238E27FC236}">
+                <a16:creationId xmlns:a16="http://schemas.microsoft.com/office/drawing/2014/main" id="{D0BA3D52-0F82-438D-9144-E4D81C7FECDA}"/>
+              </a:ext>
+            </a:extLst>
+          </p:cNvPr>
+          <p:cNvSpPr/>
+          <p:nvPr/>
+        </p:nvSpPr>
+        <p:spPr>
+          <a:xfrm>
+            <a:off x="3077105" y="1218353"/>
+            <a:ext cx="690562" cy="579120"/>
+          </a:xfrm>
+          <a:prstGeom prst="roundRect">
+            <a:avLst>
+              <a:gd name="adj" fmla="val 26901"/>
+            </a:avLst>
+          </a:prstGeom>
+          <a:solidFill>
+            <a:schemeClr val="bg1">
+              <a:alpha val="18000"/>
+            </a:schemeClr>
+          </a:solidFill>
+          <a:ln w="19050">
+            <a:solidFill>
+              <a:srgbClr val="F2951A"/>
+            </a:solidFill>
+          </a:ln>
+        </p:spPr>
+        <p:style>
+          <a:lnRef idx="2">
+            <a:schemeClr val="accent1">
+              <a:shade val="50000"/>
+            </a:schemeClr>
+          </a:lnRef>
+          <a:fillRef idx="1">
+            <a:schemeClr val="accent1"/>
+          </a:fillRef>
+          <a:effectRef idx="0">
+            <a:schemeClr val="accent1"/>
+          </a:effectRef>
+          <a:fontRef idx="minor">
+            <a:schemeClr val="lt1"/>
+          </a:fontRef>
+        </p:style>
+        <p:txBody>
+          <a:bodyPr rtlCol="0" anchor="ctr"/>
+          <a:lstStyle/>
+          <a:p>
+            <a:pPr algn="ctr"/>
+            <a:endParaRPr lang="en-SG"/>
+          </a:p>
+        </p:txBody>
+      </p:sp>
+      <p:sp>
+        <p:nvSpPr>
+          <p:cNvPr id="10" name="Rectangle: Rounded Corners 9">
+            <a:extLst>
+              <a:ext uri="{FF2B5EF4-FFF2-40B4-BE49-F238E27FC236}">
+                <a16:creationId xmlns:a16="http://schemas.microsoft.com/office/drawing/2014/main" id="{E446566A-4528-44D0-9B07-84E8D668C950}"/>
+              </a:ext>
+            </a:extLst>
+          </p:cNvPr>
+          <p:cNvSpPr/>
+          <p:nvPr/>
+        </p:nvSpPr>
+        <p:spPr>
+          <a:xfrm>
+            <a:off x="3773932" y="1218353"/>
+            <a:ext cx="1077467" cy="579120"/>
+          </a:xfrm>
+          <a:prstGeom prst="roundRect">
+            <a:avLst>
+              <a:gd name="adj" fmla="val 26901"/>
+            </a:avLst>
+          </a:prstGeom>
+          <a:solidFill>
+            <a:schemeClr val="bg1">
+              <a:alpha val="18000"/>
+            </a:schemeClr>
+          </a:solidFill>
+          <a:ln w="19050">
+            <a:solidFill>
+              <a:srgbClr val="F2951A"/>
+            </a:solidFill>
+          </a:ln>
+        </p:spPr>
+        <p:style>
+          <a:lnRef idx="2">
+            <a:schemeClr val="accent1">
+              <a:shade val="50000"/>
+            </a:schemeClr>
+          </a:lnRef>
+          <a:fillRef idx="1">
+            <a:schemeClr val="accent1"/>
+          </a:fillRef>
+          <a:effectRef idx="0">
+            <a:schemeClr val="accent1"/>
+          </a:effectRef>
+          <a:fontRef idx="minor">
+            <a:schemeClr val="lt1"/>
+          </a:fontRef>
+        </p:style>
+        <p:txBody>
+          <a:bodyPr rtlCol="0" anchor="ctr"/>
+          <a:lstStyle/>
+          <a:p>
+            <a:pPr algn="ctr"/>
+            <a:endParaRPr lang="en-SG"/>
+          </a:p>
+        </p:txBody>
+      </p:sp>
+      <p:cxnSp>
+        <p:nvCxnSpPr>
+          <p:cNvPr id="11" name="Straight Arrow Connector 10">
+            <a:extLst>
+              <a:ext uri="{FF2B5EF4-FFF2-40B4-BE49-F238E27FC236}">
+                <a16:creationId xmlns:a16="http://schemas.microsoft.com/office/drawing/2014/main" id="{C82E35C4-363C-4591-ADD9-D46B709EA289}"/>
+              </a:ext>
+            </a:extLst>
+          </p:cNvPr>
+          <p:cNvCxnSpPr>
+            <a:cxnSpLocks/>
+          </p:cNvCxnSpPr>
+          <p:nvPr/>
+        </p:nvCxnSpPr>
+        <p:spPr>
+          <a:xfrm>
+            <a:off x="4851399" y="1458621"/>
+            <a:ext cx="1059390" cy="0"/>
+          </a:xfrm>
+          <a:prstGeom prst="straightConnector1">
+            <a:avLst/>
+          </a:prstGeom>
+          <a:ln w="38100">
+            <a:solidFill>
+              <a:srgbClr val="F2951A"/>
+            </a:solidFill>
+            <a:tailEnd type="triangle"/>
+          </a:ln>
+        </p:spPr>
+        <p:style>
+          <a:lnRef idx="1">
+            <a:schemeClr val="accent1"/>
+          </a:lnRef>
+          <a:fillRef idx="0">
+            <a:schemeClr val="accent1"/>
+          </a:fillRef>
+          <a:effectRef idx="0">
+            <a:schemeClr val="accent1"/>
+          </a:effectRef>
+          <a:fontRef idx="minor">
+            <a:schemeClr val="tx1"/>
+          </a:fontRef>
+        </p:style>
+      </p:cxnSp>
+      <p:sp>
+        <p:nvSpPr>
+          <p:cNvPr id="14" name="Rectangle: Rounded Corners 13">
+            <a:extLst>
+              <a:ext uri="{FF2B5EF4-FFF2-40B4-BE49-F238E27FC236}">
+                <a16:creationId xmlns:a16="http://schemas.microsoft.com/office/drawing/2014/main" id="{18BCA40D-91BD-4B8E-9B16-0F01EEBE0BAB}"/>
+              </a:ext>
+            </a:extLst>
+          </p:cNvPr>
+          <p:cNvSpPr/>
+          <p:nvPr/>
+        </p:nvSpPr>
+        <p:spPr>
+          <a:xfrm>
+            <a:off x="5928866" y="1209515"/>
+            <a:ext cx="1753576" cy="525304"/>
+          </a:xfrm>
+          <a:prstGeom prst="roundRect">
+            <a:avLst/>
+          </a:prstGeom>
+          <a:solidFill>
+            <a:srgbClr val="F2951A"/>
+          </a:solidFill>
+          <a:ln w="31750">
+            <a:solidFill>
+              <a:srgbClr val="F2951A"/>
+            </a:solidFill>
+          </a:ln>
+        </p:spPr>
+        <p:style>
+          <a:lnRef idx="2">
+            <a:schemeClr val="accent1">
+              <a:shade val="50000"/>
+            </a:schemeClr>
+          </a:lnRef>
+          <a:fillRef idx="1">
+            <a:schemeClr val="accent1"/>
+          </a:fillRef>
+          <a:effectRef idx="0">
+            <a:schemeClr val="accent1"/>
+          </a:effectRef>
+          <a:fontRef idx="minor">
+            <a:schemeClr val="lt1"/>
+          </a:fontRef>
+        </p:style>
+        <p:txBody>
+          <a:bodyPr rtlCol="0" anchor="ctr"/>
+          <a:lstStyle/>
+          <a:p>
+            <a:pPr algn="ctr"/>
+            <a:r>
+              <a:rPr lang="en-SG" sz="1200" dirty="0" err="1">
+                <a:latin typeface="Segoe UI" panose="020B0502040204020203" pitchFamily="34" charset="0"/>
+                <a:cs typeface="Segoe UI" panose="020B0502040204020203" pitchFamily="34" charset="0"/>
+              </a:rPr>
+              <a:t>CommandBoxHints</a:t>
+            </a:r>
+            <a:endParaRPr lang="en-SG" sz="1200" dirty="0">
+              <a:latin typeface="Segoe UI" panose="020B0502040204020203" pitchFamily="34" charset="0"/>
+              <a:cs typeface="Segoe UI" panose="020B0502040204020203" pitchFamily="34" charset="0"/>
+            </a:endParaRPr>
+          </a:p>
+        </p:txBody>
+      </p:sp>
+    </p:spTree>
+    <p:extLst>
+      <p:ext uri="{BB962C8B-B14F-4D97-AF65-F5344CB8AC3E}">
+        <p14:creationId xmlns:p14="http://schemas.microsoft.com/office/powerpoint/2010/main" val="3452051479"/>
+      </p:ext>
+    </p:extLst>
+  </p:cSld>
+  <p:clrMapOvr>
+    <a:masterClrMapping/>
+  </p:clrMapOvr>
+</p:sld>
+</file>
+
+<file path=ppt/slides/slide25.xml><?xml version="1.0" encoding="utf-8"?>
+<p:sld xmlns:a="http://schemas.openxmlformats.org/drawingml/2006/main" xmlns:r="http://schemas.openxmlformats.org/officeDocument/2006/relationships" xmlns:p="http://schemas.openxmlformats.org/presentationml/2006/main">
+  <p:cSld>
+    <p:spTree>
+      <p:nvGrpSpPr>
+        <p:cNvPr id="1" name=""/>
+        <p:cNvGrpSpPr/>
+        <p:nvPr/>
+      </p:nvGrpSpPr>
+      <p:grpSpPr>
+        <a:xfrm>
+          <a:off x="0" y="0"/>
+          <a:ext cx="0" cy="0"/>
+          <a:chOff x="0" y="0"/>
+          <a:chExt cx="0" cy="0"/>
+        </a:xfrm>
+      </p:grpSpPr>
+      <p:pic>
+        <p:nvPicPr>
+          <p:cNvPr id="4" name="Picture 3">
+            <a:extLst>
+              <a:ext uri="{FF2B5EF4-FFF2-40B4-BE49-F238E27FC236}">
+                <a16:creationId xmlns:a16="http://schemas.microsoft.com/office/drawing/2014/main" id="{88A3AC61-EF5C-4890-9054-2CFDD4A7E73A}"/>
+              </a:ext>
+            </a:extLst>
+          </p:cNvPr>
+          <p:cNvPicPr>
+            <a:picLocks noChangeAspect="1"/>
+          </p:cNvPicPr>
+          <p:nvPr/>
+        </p:nvPicPr>
+        <p:blipFill>
+          <a:blip r:embed="rId2"/>
+          <a:stretch>
+            <a:fillRect/>
+          </a:stretch>
+        </p:blipFill>
+        <p:spPr>
+          <a:xfrm>
+            <a:off x="2870199" y="590550"/>
+            <a:ext cx="7172325" cy="5676900"/>
+          </a:xfrm>
+          <a:prstGeom prst="rect">
+            <a:avLst/>
+          </a:prstGeom>
+        </p:spPr>
+      </p:pic>
+      <p:cxnSp>
+        <p:nvCxnSpPr>
+          <p:cNvPr id="5" name="Straight Arrow Connector 4">
+            <a:extLst>
+              <a:ext uri="{FF2B5EF4-FFF2-40B4-BE49-F238E27FC236}">
+                <a16:creationId xmlns:a16="http://schemas.microsoft.com/office/drawing/2014/main" id="{EECBBC9B-FE77-49E5-8F99-2ABC753E20E5}"/>
+              </a:ext>
+            </a:extLst>
+          </p:cNvPr>
+          <p:cNvCxnSpPr>
+            <a:cxnSpLocks/>
+          </p:cNvCxnSpPr>
+          <p:nvPr/>
+        </p:nvCxnSpPr>
+        <p:spPr>
+          <a:xfrm flipH="1">
+            <a:off x="1907115" y="1458621"/>
+            <a:ext cx="1130564" cy="0"/>
+          </a:xfrm>
+          <a:prstGeom prst="straightConnector1">
+            <a:avLst/>
+          </a:prstGeom>
+          <a:ln w="38100">
+            <a:solidFill>
+              <a:srgbClr val="F2951A"/>
+            </a:solidFill>
+            <a:tailEnd type="triangle"/>
+          </a:ln>
+        </p:spPr>
+        <p:style>
+          <a:lnRef idx="1">
+            <a:schemeClr val="accent1"/>
+          </a:lnRef>
+          <a:fillRef idx="0">
+            <a:schemeClr val="accent1"/>
+          </a:fillRef>
+          <a:effectRef idx="0">
+            <a:schemeClr val="accent1"/>
+          </a:effectRef>
+          <a:fontRef idx="minor">
+            <a:schemeClr val="tx1"/>
+          </a:fontRef>
+        </p:style>
+      </p:cxnSp>
+      <p:sp>
+        <p:nvSpPr>
+          <p:cNvPr id="6" name="Rectangle: Rounded Corners 5">
+            <a:extLst>
+              <a:ext uri="{FF2B5EF4-FFF2-40B4-BE49-F238E27FC236}">
+                <a16:creationId xmlns:a16="http://schemas.microsoft.com/office/drawing/2014/main" id="{265DD695-1043-46C9-BD62-8A7812D4BDF6}"/>
+              </a:ext>
+            </a:extLst>
+          </p:cNvPr>
+          <p:cNvSpPr/>
+          <p:nvPr/>
+        </p:nvSpPr>
+        <p:spPr>
+          <a:xfrm>
+            <a:off x="179775" y="1218353"/>
+            <a:ext cx="1727339" cy="511758"/>
+          </a:xfrm>
+          <a:prstGeom prst="roundRect">
+            <a:avLst/>
+          </a:prstGeom>
+          <a:solidFill>
+            <a:srgbClr val="F2951A"/>
+          </a:solidFill>
+          <a:ln w="31750">
+            <a:solidFill>
+              <a:srgbClr val="F2951A"/>
+            </a:solidFill>
+          </a:ln>
+        </p:spPr>
+        <p:style>
+          <a:lnRef idx="2">
+            <a:schemeClr val="accent1">
+              <a:shade val="50000"/>
+            </a:schemeClr>
+          </a:lnRef>
+          <a:fillRef idx="1">
+            <a:schemeClr val="accent1"/>
+          </a:fillRef>
+          <a:effectRef idx="0">
+            <a:schemeClr val="accent1"/>
+          </a:effectRef>
+          <a:fontRef idx="minor">
+            <a:schemeClr val="lt1"/>
+          </a:fontRef>
+        </p:style>
+        <p:txBody>
+          <a:bodyPr rtlCol="0" anchor="ctr"/>
+          <a:lstStyle/>
+          <a:p>
+            <a:pPr algn="ctr"/>
+            <a:r>
+              <a:rPr lang="en-SG" sz="1200" dirty="0" err="1">
+                <a:latin typeface="Segoe UI" panose="020B0502040204020203" pitchFamily="34" charset="0"/>
+                <a:cs typeface="Segoe UI" panose="020B0502040204020203" pitchFamily="34" charset="0"/>
+              </a:rPr>
+              <a:t>CommandTextField</a:t>
+            </a:r>
+            <a:endParaRPr lang="en-SG" sz="1200" dirty="0">
+              <a:latin typeface="Segoe UI" panose="020B0502040204020203" pitchFamily="34" charset="0"/>
+              <a:cs typeface="Segoe UI" panose="020B0502040204020203" pitchFamily="34" charset="0"/>
+            </a:endParaRPr>
+          </a:p>
+        </p:txBody>
+      </p:sp>
+      <p:sp>
+        <p:nvSpPr>
+          <p:cNvPr id="7" name="Rectangle: Rounded Corners 6">
+            <a:extLst>
+              <a:ext uri="{FF2B5EF4-FFF2-40B4-BE49-F238E27FC236}">
+                <a16:creationId xmlns:a16="http://schemas.microsoft.com/office/drawing/2014/main" id="{2891E944-66F9-44FC-AC4A-FACD2E9BC996}"/>
+              </a:ext>
+            </a:extLst>
+          </p:cNvPr>
+          <p:cNvSpPr/>
+          <p:nvPr/>
+        </p:nvSpPr>
+        <p:spPr>
+          <a:xfrm>
+            <a:off x="3037679" y="1209514"/>
+            <a:ext cx="111921" cy="587939"/>
+          </a:xfrm>
+          <a:prstGeom prst="roundRect">
+            <a:avLst>
+              <a:gd name="adj" fmla="val 26901"/>
+            </a:avLst>
+          </a:prstGeom>
+          <a:solidFill>
+            <a:schemeClr val="bg1">
+              <a:alpha val="18000"/>
+            </a:schemeClr>
+          </a:solidFill>
+          <a:ln w="19050">
+            <a:solidFill>
+              <a:srgbClr val="F2951A"/>
+            </a:solidFill>
+          </a:ln>
+        </p:spPr>
+        <p:style>
+          <a:lnRef idx="2">
+            <a:schemeClr val="accent1">
+              <a:shade val="50000"/>
+            </a:schemeClr>
+          </a:lnRef>
+          <a:fillRef idx="1">
+            <a:schemeClr val="accent1"/>
+          </a:fillRef>
+          <a:effectRef idx="0">
+            <a:schemeClr val="accent1"/>
+          </a:effectRef>
+          <a:fontRef idx="minor">
+            <a:schemeClr val="lt1"/>
+          </a:fontRef>
+        </p:style>
+        <p:txBody>
+          <a:bodyPr rtlCol="0" anchor="ctr"/>
+          <a:lstStyle/>
+          <a:p>
+            <a:pPr algn="ctr"/>
+            <a:endParaRPr lang="en-SG"/>
+          </a:p>
+        </p:txBody>
+      </p:sp>
+      <p:sp>
+        <p:nvSpPr>
+          <p:cNvPr id="8" name="Rectangle: Rounded Corners 7">
+            <a:extLst>
+              <a:ext uri="{FF2B5EF4-FFF2-40B4-BE49-F238E27FC236}">
+                <a16:creationId xmlns:a16="http://schemas.microsoft.com/office/drawing/2014/main" id="{12270424-4FCE-4A95-9BCC-DCDC5AEAFB3E}"/>
+              </a:ext>
+            </a:extLst>
+          </p:cNvPr>
+          <p:cNvSpPr/>
+          <p:nvPr/>
+        </p:nvSpPr>
+        <p:spPr>
+          <a:xfrm>
+            <a:off x="3167677" y="1218353"/>
+            <a:ext cx="3012990" cy="579120"/>
+          </a:xfrm>
+          <a:prstGeom prst="roundRect">
+            <a:avLst>
+              <a:gd name="adj" fmla="val 26901"/>
+            </a:avLst>
+          </a:prstGeom>
+          <a:solidFill>
+            <a:schemeClr val="bg1">
+              <a:alpha val="18000"/>
+            </a:schemeClr>
+          </a:solidFill>
+          <a:ln w="19050">
+            <a:solidFill>
+              <a:srgbClr val="F2951A"/>
+            </a:solidFill>
+          </a:ln>
+        </p:spPr>
+        <p:style>
+          <a:lnRef idx="2">
+            <a:schemeClr val="accent1">
+              <a:shade val="50000"/>
+            </a:schemeClr>
+          </a:lnRef>
+          <a:fillRef idx="1">
+            <a:schemeClr val="accent1"/>
+          </a:fillRef>
+          <a:effectRef idx="0">
+            <a:schemeClr val="accent1"/>
+          </a:effectRef>
+          <a:fontRef idx="minor">
+            <a:schemeClr val="lt1"/>
+          </a:fontRef>
+        </p:style>
+        <p:txBody>
+          <a:bodyPr rtlCol="0" anchor="ctr"/>
+          <a:lstStyle/>
+          <a:p>
+            <a:pPr algn="ctr"/>
+            <a:endParaRPr lang="en-SG"/>
+          </a:p>
+        </p:txBody>
+      </p:sp>
+      <p:cxnSp>
+        <p:nvCxnSpPr>
+          <p:cNvPr id="9" name="Straight Arrow Connector 8">
+            <a:extLst>
+              <a:ext uri="{FF2B5EF4-FFF2-40B4-BE49-F238E27FC236}">
+                <a16:creationId xmlns:a16="http://schemas.microsoft.com/office/drawing/2014/main" id="{31BFD5A2-1EFB-4D5C-90C3-CBE4885693F1}"/>
+              </a:ext>
+            </a:extLst>
+          </p:cNvPr>
+          <p:cNvCxnSpPr>
+            <a:cxnSpLocks/>
+          </p:cNvCxnSpPr>
+          <p:nvPr/>
+        </p:nvCxnSpPr>
+        <p:spPr>
+          <a:xfrm>
+            <a:off x="6180667" y="1458621"/>
+            <a:ext cx="1703999" cy="0"/>
+          </a:xfrm>
+          <a:prstGeom prst="straightConnector1">
+            <a:avLst/>
+          </a:prstGeom>
+          <a:ln w="38100">
+            <a:solidFill>
+              <a:srgbClr val="F2951A"/>
+            </a:solidFill>
+            <a:tailEnd type="triangle"/>
+          </a:ln>
+        </p:spPr>
+        <p:style>
+          <a:lnRef idx="1">
+            <a:schemeClr val="accent1"/>
+          </a:lnRef>
+          <a:fillRef idx="0">
+            <a:schemeClr val="accent1"/>
+          </a:fillRef>
+          <a:effectRef idx="0">
+            <a:schemeClr val="accent1"/>
+          </a:effectRef>
+          <a:fontRef idx="minor">
+            <a:schemeClr val="tx1"/>
+          </a:fontRef>
+        </p:style>
+      </p:cxnSp>
+      <p:sp>
+        <p:nvSpPr>
+          <p:cNvPr id="10" name="Rectangle: Rounded Corners 9">
+            <a:extLst>
+              <a:ext uri="{FF2B5EF4-FFF2-40B4-BE49-F238E27FC236}">
+                <a16:creationId xmlns:a16="http://schemas.microsoft.com/office/drawing/2014/main" id="{0C9BD758-DEED-4CD2-A9B8-38D3D83EE73A}"/>
+              </a:ext>
+            </a:extLst>
+          </p:cNvPr>
+          <p:cNvSpPr/>
+          <p:nvPr/>
+        </p:nvSpPr>
+        <p:spPr>
+          <a:xfrm>
+            <a:off x="7884666" y="1272149"/>
+            <a:ext cx="1753576" cy="525304"/>
+          </a:xfrm>
+          <a:prstGeom prst="roundRect">
+            <a:avLst/>
+          </a:prstGeom>
+          <a:solidFill>
+            <a:srgbClr val="F2951A"/>
+          </a:solidFill>
+          <a:ln w="31750">
+            <a:solidFill>
+              <a:srgbClr val="F2951A"/>
+            </a:solidFill>
+          </a:ln>
+        </p:spPr>
+        <p:style>
+          <a:lnRef idx="2">
+            <a:schemeClr val="accent1">
+              <a:shade val="50000"/>
+            </a:schemeClr>
+          </a:lnRef>
+          <a:fillRef idx="1">
+            <a:schemeClr val="accent1"/>
+          </a:fillRef>
+          <a:effectRef idx="0">
+            <a:schemeClr val="accent1"/>
+          </a:effectRef>
+          <a:fontRef idx="minor">
+            <a:schemeClr val="lt1"/>
+          </a:fontRef>
+        </p:style>
+        <p:txBody>
+          <a:bodyPr rtlCol="0" anchor="ctr"/>
+          <a:lstStyle/>
+          <a:p>
+            <a:pPr algn="ctr"/>
+            <a:r>
+              <a:rPr lang="en-SG" sz="1200" dirty="0" err="1">
+                <a:latin typeface="Segoe UI" panose="020B0502040204020203" pitchFamily="34" charset="0"/>
+                <a:cs typeface="Segoe UI" panose="020B0502040204020203" pitchFamily="34" charset="0"/>
+              </a:rPr>
+              <a:t>CommandBoxHints</a:t>
+            </a:r>
+            <a:endParaRPr lang="en-SG" sz="1200" dirty="0">
+              <a:latin typeface="Segoe UI" panose="020B0502040204020203" pitchFamily="34" charset="0"/>
+              <a:cs typeface="Segoe UI" panose="020B0502040204020203" pitchFamily="34" charset="0"/>
+            </a:endParaRPr>
+          </a:p>
+        </p:txBody>
+      </p:sp>
+    </p:spTree>
+    <p:extLst>
+      <p:ext uri="{BB962C8B-B14F-4D97-AF65-F5344CB8AC3E}">
+        <p14:creationId xmlns:p14="http://schemas.microsoft.com/office/powerpoint/2010/main" val="1527124836"/>
+      </p:ext>
+    </p:extLst>
+  </p:cSld>
+  <p:clrMapOvr>
+    <a:masterClrMapping/>
+  </p:clrMapOvr>
+</p:sld>
+</file>
+
+<file path=ppt/slides/slide26.xml><?xml version="1.0" encoding="utf-8"?>
+<p:sld xmlns:a="http://schemas.openxmlformats.org/drawingml/2006/main" xmlns:r="http://schemas.openxmlformats.org/officeDocument/2006/relationships" xmlns:p="http://schemas.openxmlformats.org/presentationml/2006/main">
+  <p:cSld>
+    <p:spTree>
+      <p:nvGrpSpPr>
+        <p:cNvPr id="1" name=""/>
+        <p:cNvGrpSpPr/>
+        <p:nvPr/>
+      </p:nvGrpSpPr>
+      <p:grpSpPr>
+        <a:xfrm>
+          <a:off x="0" y="0"/>
+          <a:ext cx="0" cy="0"/>
+          <a:chOff x="0" y="0"/>
+          <a:chExt cx="0" cy="0"/>
+        </a:xfrm>
+      </p:grpSpPr>
+      <p:sp>
+        <p:nvSpPr>
+          <p:cNvPr id="7" name="Rectangle 6">
+            <a:extLst>
+              <a:ext uri="{FF2B5EF4-FFF2-40B4-BE49-F238E27FC236}">
+                <a16:creationId xmlns:a16="http://schemas.microsoft.com/office/drawing/2014/main" id="{CC4BB512-F1E1-48CB-A295-34ABF9585A59}"/>
+              </a:ext>
+            </a:extLst>
+          </p:cNvPr>
+          <p:cNvSpPr/>
+          <p:nvPr/>
+        </p:nvSpPr>
+        <p:spPr>
+          <a:xfrm>
+            <a:off x="5655734" y="1303867"/>
+            <a:ext cx="1380066" cy="533400"/>
+          </a:xfrm>
+          <a:prstGeom prst="rect">
+            <a:avLst/>
+          </a:prstGeom>
+          <a:solidFill>
+            <a:schemeClr val="tx2">
+              <a:lumMod val="75000"/>
+            </a:schemeClr>
+          </a:solidFill>
+        </p:spPr>
+        <p:style>
+          <a:lnRef idx="2">
+            <a:schemeClr val="accent1">
+              <a:shade val="50000"/>
+            </a:schemeClr>
+          </a:lnRef>
+          <a:fillRef idx="1">
+            <a:schemeClr val="accent1"/>
+          </a:fillRef>
+          <a:effectRef idx="0">
+            <a:schemeClr val="accent1"/>
+          </a:effectRef>
+          <a:fontRef idx="minor">
+            <a:schemeClr val="lt1"/>
+          </a:fontRef>
+        </p:style>
+        <p:txBody>
+          <a:bodyPr rtlCol="0" anchor="ctr"/>
+          <a:lstStyle/>
+          <a:p>
+            <a:r>
+              <a:rPr lang="en-US" dirty="0"/>
+              <a:t> add</a:t>
+            </a:r>
+          </a:p>
+        </p:txBody>
+      </p:sp>
+      <p:sp>
+        <p:nvSpPr>
+          <p:cNvPr id="8" name="Rectangle 7">
+            <a:extLst>
+              <a:ext uri="{FF2B5EF4-FFF2-40B4-BE49-F238E27FC236}">
+                <a16:creationId xmlns:a16="http://schemas.microsoft.com/office/drawing/2014/main" id="{FB75B50F-756C-4337-9E4A-B26AFFDD04E1}"/>
+              </a:ext>
+            </a:extLst>
+          </p:cNvPr>
+          <p:cNvSpPr/>
+          <p:nvPr/>
+        </p:nvSpPr>
+        <p:spPr>
+          <a:xfrm>
+            <a:off x="5655734" y="1998133"/>
+            <a:ext cx="1380066" cy="533400"/>
+          </a:xfrm>
+          <a:prstGeom prst="rect">
+            <a:avLst/>
+          </a:prstGeom>
+          <a:solidFill>
+            <a:schemeClr val="tx2">
+              <a:lumMod val="75000"/>
+            </a:schemeClr>
+          </a:solidFill>
+        </p:spPr>
+        <p:style>
+          <a:lnRef idx="2">
+            <a:schemeClr val="accent1">
+              <a:shade val="50000"/>
+            </a:schemeClr>
+          </a:lnRef>
+          <a:fillRef idx="1">
+            <a:schemeClr val="accent1"/>
+          </a:fillRef>
+          <a:effectRef idx="0">
+            <a:schemeClr val="accent1"/>
+          </a:effectRef>
+          <a:fontRef idx="minor">
+            <a:schemeClr val="lt1"/>
+          </a:fontRef>
+        </p:style>
+        <p:txBody>
+          <a:bodyPr rtlCol="0" anchor="ctr"/>
+          <a:lstStyle/>
+          <a:p>
+            <a:r>
+              <a:rPr lang="en-US" dirty="0"/>
+              <a:t> </a:t>
+            </a:r>
+            <a:r>
+              <a:rPr lang="en-US" dirty="0">
+                <a:solidFill>
+                  <a:schemeClr val="tx1">
+                    <a:lumMod val="50000"/>
+                    <a:lumOff val="50000"/>
+                  </a:schemeClr>
+                </a:solidFill>
+              </a:rPr>
+              <a:t>add n/name</a:t>
+            </a:r>
+          </a:p>
+        </p:txBody>
+      </p:sp>
+      <p:sp>
+        <p:nvSpPr>
+          <p:cNvPr id="9" name="Rectangle 8">
+            <a:extLst>
+              <a:ext uri="{FF2B5EF4-FFF2-40B4-BE49-F238E27FC236}">
+                <a16:creationId xmlns:a16="http://schemas.microsoft.com/office/drawing/2014/main" id="{84B0BF1D-4D95-482B-94FE-BF1C66157755}"/>
+              </a:ext>
+            </a:extLst>
+          </p:cNvPr>
+          <p:cNvSpPr/>
+          <p:nvPr/>
+        </p:nvSpPr>
+        <p:spPr>
+          <a:xfrm>
+            <a:off x="5655734" y="2692399"/>
+            <a:ext cx="1380066" cy="533400"/>
+          </a:xfrm>
+          <a:prstGeom prst="rect">
+            <a:avLst/>
+          </a:prstGeom>
+          <a:solidFill>
+            <a:schemeClr val="tx2">
+              <a:lumMod val="75000"/>
+            </a:schemeClr>
+          </a:solidFill>
+        </p:spPr>
+        <p:style>
+          <a:lnRef idx="2">
+            <a:schemeClr val="accent1">
+              <a:shade val="50000"/>
+            </a:schemeClr>
+          </a:lnRef>
+          <a:fillRef idx="1">
+            <a:schemeClr val="accent1"/>
+          </a:fillRef>
+          <a:effectRef idx="0">
+            <a:schemeClr val="accent1"/>
+          </a:effectRef>
+          <a:fontRef idx="minor">
+            <a:schemeClr val="lt1"/>
+          </a:fontRef>
+        </p:style>
+        <p:txBody>
+          <a:bodyPr rtlCol="0" anchor="ctr"/>
+          <a:lstStyle/>
+          <a:p>
+            <a:r>
+              <a:rPr lang="en-US" dirty="0"/>
+              <a:t> add </a:t>
+            </a:r>
+            <a:r>
+              <a:rPr lang="en-US" dirty="0">
+                <a:solidFill>
+                  <a:schemeClr val="tx1">
+                    <a:lumMod val="50000"/>
+                    <a:lumOff val="50000"/>
+                  </a:schemeClr>
+                </a:solidFill>
+              </a:rPr>
+              <a:t>n/name</a:t>
+            </a:r>
+            <a:endParaRPr lang="en-US" dirty="0"/>
+          </a:p>
+        </p:txBody>
+      </p:sp>
+      <p:sp>
+        <p:nvSpPr>
+          <p:cNvPr id="10" name="Rectangle: Rounded Corners 9">
+            <a:extLst>
+              <a:ext uri="{FF2B5EF4-FFF2-40B4-BE49-F238E27FC236}">
+                <a16:creationId xmlns:a16="http://schemas.microsoft.com/office/drawing/2014/main" id="{1BC06B75-4895-4F0C-A0ED-ACB45F5BA157}"/>
+              </a:ext>
+            </a:extLst>
+          </p:cNvPr>
+          <p:cNvSpPr/>
+          <p:nvPr/>
+        </p:nvSpPr>
+        <p:spPr>
+          <a:xfrm>
+            <a:off x="3303975" y="1295401"/>
+            <a:ext cx="1800389" cy="533400"/>
+          </a:xfrm>
+          <a:prstGeom prst="roundRect">
+            <a:avLst/>
+          </a:prstGeom>
+          <a:solidFill>
+            <a:srgbClr val="F2951A"/>
+          </a:solidFill>
+          <a:ln w="31750">
+            <a:solidFill>
+              <a:srgbClr val="F2951A"/>
+            </a:solidFill>
+          </a:ln>
+        </p:spPr>
+        <p:style>
+          <a:lnRef idx="2">
+            <a:schemeClr val="accent1">
+              <a:shade val="50000"/>
+            </a:schemeClr>
+          </a:lnRef>
+          <a:fillRef idx="1">
+            <a:schemeClr val="accent1"/>
+          </a:fillRef>
+          <a:effectRef idx="0">
+            <a:schemeClr val="accent1"/>
+          </a:effectRef>
+          <a:fontRef idx="minor">
+            <a:schemeClr val="lt1"/>
+          </a:fontRef>
+        </p:style>
+        <p:txBody>
+          <a:bodyPr rtlCol="0" anchor="ctr"/>
+          <a:lstStyle/>
+          <a:p>
+            <a:pPr algn="ctr"/>
+            <a:r>
+              <a:rPr lang="en-SG" sz="1200" dirty="0" err="1">
+                <a:latin typeface="Segoe UI" panose="020B0502040204020203" pitchFamily="34" charset="0"/>
+                <a:cs typeface="Segoe UI" panose="020B0502040204020203" pitchFamily="34" charset="0"/>
+              </a:rPr>
+              <a:t>CommandTextField</a:t>
+            </a:r>
+            <a:endParaRPr lang="en-SG" sz="1200" dirty="0">
+              <a:latin typeface="Segoe UI" panose="020B0502040204020203" pitchFamily="34" charset="0"/>
+              <a:cs typeface="Segoe UI" panose="020B0502040204020203" pitchFamily="34" charset="0"/>
+            </a:endParaRPr>
+          </a:p>
+        </p:txBody>
+      </p:sp>
+      <p:cxnSp>
+        <p:nvCxnSpPr>
+          <p:cNvPr id="11" name="Straight Arrow Connector 10">
+            <a:extLst>
+              <a:ext uri="{FF2B5EF4-FFF2-40B4-BE49-F238E27FC236}">
+                <a16:creationId xmlns:a16="http://schemas.microsoft.com/office/drawing/2014/main" id="{4DE226C7-FB33-4A0C-9FD9-0521E5E9AEDF}"/>
+              </a:ext>
+            </a:extLst>
+          </p:cNvPr>
+          <p:cNvCxnSpPr>
+            <a:cxnSpLocks/>
+          </p:cNvCxnSpPr>
+          <p:nvPr/>
+        </p:nvCxnSpPr>
+        <p:spPr>
+          <a:xfrm>
+            <a:off x="5116546" y="1553635"/>
+            <a:ext cx="551370" cy="8466"/>
+          </a:xfrm>
+          <a:prstGeom prst="straightConnector1">
+            <a:avLst/>
+          </a:prstGeom>
+          <a:ln w="38100">
+            <a:solidFill>
+              <a:srgbClr val="F2951A"/>
+            </a:solidFill>
+            <a:tailEnd type="triangle"/>
+          </a:ln>
+        </p:spPr>
+        <p:style>
+          <a:lnRef idx="1">
+            <a:schemeClr val="accent1"/>
+          </a:lnRef>
+          <a:fillRef idx="0">
+            <a:schemeClr val="accent1"/>
+          </a:fillRef>
+          <a:effectRef idx="0">
+            <a:schemeClr val="accent1"/>
+          </a:effectRef>
+          <a:fontRef idx="minor">
+            <a:schemeClr val="tx1"/>
+          </a:fontRef>
+        </p:style>
+      </p:cxnSp>
+      <p:sp>
+        <p:nvSpPr>
+          <p:cNvPr id="15" name="Rectangle: Rounded Corners 14">
+            <a:extLst>
+              <a:ext uri="{FF2B5EF4-FFF2-40B4-BE49-F238E27FC236}">
+                <a16:creationId xmlns:a16="http://schemas.microsoft.com/office/drawing/2014/main" id="{EB7501FC-A37E-40F5-9CF6-D2FFEA0CB6F9}"/>
+              </a:ext>
+            </a:extLst>
+          </p:cNvPr>
+          <p:cNvSpPr/>
+          <p:nvPr/>
+        </p:nvSpPr>
+        <p:spPr>
+          <a:xfrm>
+            <a:off x="3316157" y="1998133"/>
+            <a:ext cx="1800389" cy="533400"/>
+          </a:xfrm>
+          <a:prstGeom prst="roundRect">
+            <a:avLst/>
+          </a:prstGeom>
+          <a:solidFill>
+            <a:srgbClr val="F2951A"/>
+          </a:solidFill>
+          <a:ln w="31750">
+            <a:solidFill>
+              <a:srgbClr val="F2951A"/>
+            </a:solidFill>
+          </a:ln>
+        </p:spPr>
+        <p:style>
+          <a:lnRef idx="2">
+            <a:schemeClr val="accent1">
+              <a:shade val="50000"/>
+            </a:schemeClr>
+          </a:lnRef>
+          <a:fillRef idx="1">
+            <a:schemeClr val="accent1"/>
+          </a:fillRef>
+          <a:effectRef idx="0">
+            <a:schemeClr val="accent1"/>
+          </a:effectRef>
+          <a:fontRef idx="minor">
+            <a:schemeClr val="lt1"/>
+          </a:fontRef>
+        </p:style>
+        <p:txBody>
+          <a:bodyPr rtlCol="0" anchor="ctr"/>
+          <a:lstStyle/>
+          <a:p>
+            <a:pPr algn="ctr"/>
+            <a:r>
+              <a:rPr lang="en-SG" sz="1200" dirty="0" err="1">
+                <a:latin typeface="Segoe UI" panose="020B0502040204020203" pitchFamily="34" charset="0"/>
+                <a:cs typeface="Segoe UI" panose="020B0502040204020203" pitchFamily="34" charset="0"/>
+              </a:rPr>
+              <a:t>CommandBoxHints</a:t>
+            </a:r>
+            <a:endParaRPr lang="en-SG" sz="1200" dirty="0">
+              <a:latin typeface="Segoe UI" panose="020B0502040204020203" pitchFamily="34" charset="0"/>
+              <a:cs typeface="Segoe UI" panose="020B0502040204020203" pitchFamily="34" charset="0"/>
+            </a:endParaRPr>
+          </a:p>
+        </p:txBody>
+      </p:sp>
+      <p:cxnSp>
+        <p:nvCxnSpPr>
+          <p:cNvPr id="16" name="Straight Arrow Connector 15">
+            <a:extLst>
+              <a:ext uri="{FF2B5EF4-FFF2-40B4-BE49-F238E27FC236}">
+                <a16:creationId xmlns:a16="http://schemas.microsoft.com/office/drawing/2014/main" id="{42F80155-BD0A-4E4F-97E8-7CC2D37F4A7A}"/>
+              </a:ext>
+            </a:extLst>
+          </p:cNvPr>
+          <p:cNvCxnSpPr>
+            <a:cxnSpLocks/>
+          </p:cNvCxnSpPr>
+          <p:nvPr/>
+        </p:nvCxnSpPr>
+        <p:spPr>
+          <a:xfrm>
+            <a:off x="5128728" y="2256367"/>
+            <a:ext cx="551370" cy="8466"/>
+          </a:xfrm>
+          <a:prstGeom prst="straightConnector1">
+            <a:avLst/>
+          </a:prstGeom>
+          <a:ln w="38100">
+            <a:solidFill>
+              <a:srgbClr val="F2951A"/>
+            </a:solidFill>
+            <a:tailEnd type="triangle"/>
+          </a:ln>
+        </p:spPr>
+        <p:style>
+          <a:lnRef idx="1">
+            <a:schemeClr val="accent1"/>
+          </a:lnRef>
+          <a:fillRef idx="0">
+            <a:schemeClr val="accent1"/>
+          </a:fillRef>
+          <a:effectRef idx="0">
+            <a:schemeClr val="accent1"/>
+          </a:effectRef>
+          <a:fontRef idx="minor">
+            <a:schemeClr val="tx1"/>
+          </a:fontRef>
+        </p:style>
+      </p:cxnSp>
+      <p:sp>
+        <p:nvSpPr>
+          <p:cNvPr id="17" name="Rectangle: Rounded Corners 16">
+            <a:extLst>
+              <a:ext uri="{FF2B5EF4-FFF2-40B4-BE49-F238E27FC236}">
+                <a16:creationId xmlns:a16="http://schemas.microsoft.com/office/drawing/2014/main" id="{39DF436C-DBDB-4EAC-8FC1-D454D72A253D}"/>
+              </a:ext>
+            </a:extLst>
+          </p:cNvPr>
+          <p:cNvSpPr/>
+          <p:nvPr/>
+        </p:nvSpPr>
+        <p:spPr>
+          <a:xfrm>
+            <a:off x="3291793" y="2683933"/>
+            <a:ext cx="1800389" cy="533400"/>
+          </a:xfrm>
+          <a:prstGeom prst="roundRect">
+            <a:avLst/>
+          </a:prstGeom>
+          <a:solidFill>
+            <a:srgbClr val="F2951A"/>
+          </a:solidFill>
+          <a:ln w="31750">
+            <a:solidFill>
+              <a:srgbClr val="F2951A"/>
+            </a:solidFill>
+          </a:ln>
+        </p:spPr>
+        <p:style>
+          <a:lnRef idx="2">
+            <a:schemeClr val="accent1">
+              <a:shade val="50000"/>
+            </a:schemeClr>
+          </a:lnRef>
+          <a:fillRef idx="1">
+            <a:schemeClr val="accent1"/>
+          </a:fillRef>
+          <a:effectRef idx="0">
+            <a:schemeClr val="accent1"/>
+          </a:effectRef>
+          <a:fontRef idx="minor">
+            <a:schemeClr val="lt1"/>
+          </a:fontRef>
+        </p:style>
+        <p:txBody>
+          <a:bodyPr rtlCol="0" anchor="ctr"/>
+          <a:lstStyle/>
+          <a:p>
+            <a:pPr algn="ctr"/>
+            <a:r>
+              <a:rPr lang="en-SG" sz="1200" dirty="0" err="1">
+                <a:latin typeface="Segoe UI" panose="020B0502040204020203" pitchFamily="34" charset="0"/>
+                <a:cs typeface="Segoe UI" panose="020B0502040204020203" pitchFamily="34" charset="0"/>
+              </a:rPr>
+              <a:t>overlayed</a:t>
+            </a:r>
+            <a:endParaRPr lang="en-SG" sz="1200" dirty="0">
+              <a:latin typeface="Segoe UI" panose="020B0502040204020203" pitchFamily="34" charset="0"/>
+              <a:cs typeface="Segoe UI" panose="020B0502040204020203" pitchFamily="34" charset="0"/>
+            </a:endParaRPr>
+          </a:p>
+        </p:txBody>
+      </p:sp>
+      <p:cxnSp>
+        <p:nvCxnSpPr>
+          <p:cNvPr id="18" name="Straight Arrow Connector 17">
+            <a:extLst>
+              <a:ext uri="{FF2B5EF4-FFF2-40B4-BE49-F238E27FC236}">
+                <a16:creationId xmlns:a16="http://schemas.microsoft.com/office/drawing/2014/main" id="{084ECBB3-1EBC-474D-8426-078E1CD9C5F7}"/>
+              </a:ext>
+            </a:extLst>
+          </p:cNvPr>
+          <p:cNvCxnSpPr>
+            <a:cxnSpLocks/>
+          </p:cNvCxnSpPr>
+          <p:nvPr/>
+        </p:nvCxnSpPr>
+        <p:spPr>
+          <a:xfrm>
+            <a:off x="5104364" y="2942167"/>
+            <a:ext cx="551370" cy="8466"/>
+          </a:xfrm>
+          <a:prstGeom prst="straightConnector1">
+            <a:avLst/>
+          </a:prstGeom>
+          <a:ln w="38100">
+            <a:solidFill>
+              <a:srgbClr val="F2951A"/>
+            </a:solidFill>
+            <a:tailEnd type="triangle"/>
+          </a:ln>
+        </p:spPr>
+        <p:style>
+          <a:lnRef idx="1">
+            <a:schemeClr val="accent1"/>
+          </a:lnRef>
+          <a:fillRef idx="0">
+            <a:schemeClr val="accent1"/>
+          </a:fillRef>
+          <a:effectRef idx="0">
+            <a:schemeClr val="accent1"/>
+          </a:effectRef>
+          <a:fontRef idx="minor">
+            <a:schemeClr val="tx1"/>
+          </a:fontRef>
+        </p:style>
+      </p:cxnSp>
+    </p:spTree>
+    <p:extLst>
+      <p:ext uri="{BB962C8B-B14F-4D97-AF65-F5344CB8AC3E}">
+        <p14:creationId xmlns:p14="http://schemas.microsoft.com/office/powerpoint/2010/main" val="1097715579"/>
+      </p:ext>
+    </p:extLst>
+  </p:cSld>
+  <p:clrMapOvr>
+    <a:masterClrMapping/>
+  </p:clrMapOvr>
+</p:sld>
+</file>
+
+<file path=ppt/slides/slide27.xml><?xml version="1.0" encoding="utf-8"?>
+<p:sld xmlns:a="http://schemas.openxmlformats.org/drawingml/2006/main" xmlns:r="http://schemas.openxmlformats.org/officeDocument/2006/relationships" xmlns:p="http://schemas.openxmlformats.org/presentationml/2006/main">
+  <p:cSld>
+    <p:spTree>
+      <p:nvGrpSpPr>
+        <p:cNvPr id="1" name=""/>
+        <p:cNvGrpSpPr/>
+        <p:nvPr/>
+      </p:nvGrpSpPr>
+      <p:grpSpPr>
+        <a:xfrm>
+          <a:off x="0" y="0"/>
+          <a:ext cx="0" cy="0"/>
+          <a:chOff x="0" y="0"/>
+          <a:chExt cx="0" cy="0"/>
+        </a:xfrm>
+      </p:grpSpPr>
+      <p:pic>
+        <p:nvPicPr>
+          <p:cNvPr id="6" name="Picture 5">
+            <a:extLst>
+              <a:ext uri="{FF2B5EF4-FFF2-40B4-BE49-F238E27FC236}">
+                <a16:creationId xmlns:a16="http://schemas.microsoft.com/office/drawing/2014/main" id="{7124023A-D3C5-4986-A312-C48749F1BFD7}"/>
+              </a:ext>
+            </a:extLst>
+          </p:cNvPr>
+          <p:cNvPicPr>
+            <a:picLocks noChangeAspect="1"/>
+          </p:cNvPicPr>
+          <p:nvPr/>
+        </p:nvPicPr>
+        <p:blipFill>
+          <a:blip r:embed="rId2"/>
+          <a:stretch>
+            <a:fillRect/>
+          </a:stretch>
+        </p:blipFill>
+        <p:spPr>
+          <a:xfrm>
+            <a:off x="2865437" y="595312"/>
+            <a:ext cx="7181850" cy="5667375"/>
+          </a:xfrm>
+          <a:prstGeom prst="rect">
+            <a:avLst/>
+          </a:prstGeom>
+        </p:spPr>
+      </p:pic>
+      <p:cxnSp>
+        <p:nvCxnSpPr>
+          <p:cNvPr id="7" name="Straight Arrow Connector 6">
+            <a:extLst>
+              <a:ext uri="{FF2B5EF4-FFF2-40B4-BE49-F238E27FC236}">
+                <a16:creationId xmlns:a16="http://schemas.microsoft.com/office/drawing/2014/main" id="{F3FAC027-EB8A-432B-84AE-C42DF73B798F}"/>
+              </a:ext>
+            </a:extLst>
+          </p:cNvPr>
+          <p:cNvCxnSpPr>
+            <a:cxnSpLocks/>
+          </p:cNvCxnSpPr>
+          <p:nvPr/>
+        </p:nvCxnSpPr>
+        <p:spPr>
+          <a:xfrm flipH="1">
+            <a:off x="2770049" y="1552173"/>
+            <a:ext cx="243511" cy="0"/>
+          </a:xfrm>
+          <a:prstGeom prst="straightConnector1">
+            <a:avLst/>
+          </a:prstGeom>
+          <a:ln w="38100">
+            <a:solidFill>
+              <a:srgbClr val="F2951A"/>
+            </a:solidFill>
+            <a:tailEnd type="triangle"/>
+          </a:ln>
+        </p:spPr>
+        <p:style>
+          <a:lnRef idx="1">
+            <a:schemeClr val="accent1"/>
+          </a:lnRef>
+          <a:fillRef idx="0">
+            <a:schemeClr val="accent1"/>
+          </a:fillRef>
+          <a:effectRef idx="0">
+            <a:schemeClr val="accent1"/>
+          </a:effectRef>
+          <a:fontRef idx="minor">
+            <a:schemeClr val="tx1"/>
+          </a:fontRef>
+        </p:style>
+      </p:cxnSp>
+      <p:sp>
+        <p:nvSpPr>
+          <p:cNvPr id="8" name="Rectangle: Rounded Corners 7">
+            <a:extLst>
+              <a:ext uri="{FF2B5EF4-FFF2-40B4-BE49-F238E27FC236}">
+                <a16:creationId xmlns:a16="http://schemas.microsoft.com/office/drawing/2014/main" id="{E0259AC8-4463-4E91-80A2-26D6E7807E41}"/>
+              </a:ext>
+            </a:extLst>
+          </p:cNvPr>
+          <p:cNvSpPr/>
+          <p:nvPr/>
+        </p:nvSpPr>
+        <p:spPr>
+          <a:xfrm>
+            <a:off x="3013560" y="1252628"/>
+            <a:ext cx="3692040" cy="579120"/>
+          </a:xfrm>
+          <a:prstGeom prst="roundRect">
+            <a:avLst/>
+          </a:prstGeom>
+          <a:solidFill>
+            <a:schemeClr val="bg1">
+              <a:alpha val="18000"/>
+            </a:schemeClr>
+          </a:solidFill>
+          <a:ln w="38100">
+            <a:solidFill>
+              <a:srgbClr val="F2951A"/>
+            </a:solidFill>
+          </a:ln>
+        </p:spPr>
+        <p:style>
+          <a:lnRef idx="2">
+            <a:schemeClr val="accent1">
+              <a:shade val="50000"/>
+            </a:schemeClr>
+          </a:lnRef>
+          <a:fillRef idx="1">
+            <a:schemeClr val="accent1"/>
+          </a:fillRef>
+          <a:effectRef idx="0">
+            <a:schemeClr val="accent1"/>
+          </a:effectRef>
+          <a:fontRef idx="minor">
+            <a:schemeClr val="lt1"/>
+          </a:fontRef>
+        </p:style>
+        <p:txBody>
+          <a:bodyPr rtlCol="0" anchor="ctr"/>
+          <a:lstStyle/>
+          <a:p>
+            <a:pPr algn="ctr"/>
+            <a:endParaRPr lang="en-SG"/>
+          </a:p>
+        </p:txBody>
+      </p:sp>
+      <p:sp>
+        <p:nvSpPr>
+          <p:cNvPr id="10" name="Rectangle: Rounded Corners 9">
+            <a:extLst>
+              <a:ext uri="{FF2B5EF4-FFF2-40B4-BE49-F238E27FC236}">
+                <a16:creationId xmlns:a16="http://schemas.microsoft.com/office/drawing/2014/main" id="{CC5BA69A-8C08-4F5F-BBD4-8D3944734F2F}"/>
+              </a:ext>
+            </a:extLst>
+          </p:cNvPr>
+          <p:cNvSpPr/>
+          <p:nvPr/>
+        </p:nvSpPr>
+        <p:spPr>
+          <a:xfrm>
+            <a:off x="1363133" y="1259333"/>
+            <a:ext cx="1406916" cy="585679"/>
+          </a:xfrm>
+          <a:prstGeom prst="roundRect">
+            <a:avLst/>
+          </a:prstGeom>
+          <a:solidFill>
+            <a:srgbClr val="F2951A"/>
+          </a:solidFill>
+          <a:ln w="31750">
+            <a:solidFill>
+              <a:srgbClr val="F2951A"/>
+            </a:solidFill>
+          </a:ln>
+        </p:spPr>
+        <p:style>
+          <a:lnRef idx="2">
+            <a:schemeClr val="accent1">
+              <a:shade val="50000"/>
+            </a:schemeClr>
+          </a:lnRef>
+          <a:fillRef idx="1">
+            <a:schemeClr val="accent1"/>
+          </a:fillRef>
+          <a:effectRef idx="0">
+            <a:schemeClr val="accent1"/>
+          </a:effectRef>
+          <a:fontRef idx="minor">
+            <a:schemeClr val="lt1"/>
+          </a:fontRef>
+        </p:style>
+        <p:txBody>
+          <a:bodyPr rtlCol="0" anchor="ctr"/>
+          <a:lstStyle/>
+          <a:p>
+            <a:pPr algn="ctr"/>
+            <a:r>
+              <a:rPr lang="en-SG" sz="1200" dirty="0">
+                <a:latin typeface="Segoe UI" panose="020B0502040204020203" pitchFamily="34" charset="0"/>
+                <a:cs typeface="Segoe UI" panose="020B0502040204020203" pitchFamily="34" charset="0"/>
+              </a:rPr>
+              <a:t>Clamped to half window width</a:t>
+            </a:r>
+          </a:p>
+        </p:txBody>
+      </p:sp>
+    </p:spTree>
+    <p:extLst>
+      <p:ext uri="{BB962C8B-B14F-4D97-AF65-F5344CB8AC3E}">
+        <p14:creationId xmlns:p14="http://schemas.microsoft.com/office/powerpoint/2010/main" val="2756083025"/>
+      </p:ext>
+    </p:extLst>
+  </p:cSld>
+  <p:clrMapOvr>
+    <a:masterClrMapping/>
+  </p:clrMapOvr>
+</p:sld>
+</file>
+
 <file path=ppt/slides/slide3.xml><?xml version="1.0" encoding="utf-8"?>
 <p:sld xmlns:a="http://schemas.openxmlformats.org/drawingml/2006/main" xmlns:r="http://schemas.openxmlformats.org/officeDocument/2006/relationships" xmlns:p="http://schemas.openxmlformats.org/presentationml/2006/main">
   <p:cSld>
@@ -9008,7 +10937,7 @@
         </p:nvSpPr>
         <p:spPr>
           <a:xfrm>
-            <a:off x="1610070" y="900055"/>
+            <a:off x="1651984" y="916978"/>
             <a:ext cx="525031" cy="525304"/>
           </a:xfrm>
           <a:prstGeom prst="roundRect">

</xml_diff>

<commit_message>
Docs: Update portfolio @nicholaschuayunzhi
</commit_message>
<xml_diff>
--- a/docs/diagrams/UserGuideTemplate.pptx
+++ b/docs/diagrams/UserGuideTemplate.pptx
@@ -32,6 +32,8 @@
     <p:sldId id="279" r:id="rId26"/>
     <p:sldId id="282" r:id="rId27"/>
     <p:sldId id="281" r:id="rId28"/>
+    <p:sldId id="283" r:id="rId29"/>
+    <p:sldId id="284" r:id="rId30"/>
   </p:sldIdLst>
   <p:sldSz cx="12912725" cy="6858000"/>
   <p:notesSz cx="6858000" cy="9144000"/>
@@ -9758,6 +9760,450 @@
 </p:sld>
 </file>
 
+<file path=ppt/slides/slide28.xml><?xml version="1.0" encoding="utf-8"?>
+<p:sld xmlns:a="http://schemas.openxmlformats.org/drawingml/2006/main" xmlns:r="http://schemas.openxmlformats.org/officeDocument/2006/relationships" xmlns:p="http://schemas.openxmlformats.org/presentationml/2006/main">
+  <p:cSld>
+    <p:spTree>
+      <p:nvGrpSpPr>
+        <p:cNvPr id="1" name=""/>
+        <p:cNvGrpSpPr/>
+        <p:nvPr/>
+      </p:nvGrpSpPr>
+      <p:grpSpPr>
+        <a:xfrm>
+          <a:off x="0" y="0"/>
+          <a:ext cx="0" cy="0"/>
+          <a:chOff x="0" y="0"/>
+          <a:chExt cx="0" cy="0"/>
+        </a:xfrm>
+      </p:grpSpPr>
+      <p:pic>
+        <p:nvPicPr>
+          <p:cNvPr id="4" name="Picture 3">
+            <a:extLst>
+              <a:ext uri="{FF2B5EF4-FFF2-40B4-BE49-F238E27FC236}">
+                <a16:creationId xmlns:a16="http://schemas.microsoft.com/office/drawing/2014/main" id="{5741F3D0-5DD3-4ADA-95E9-808EAAB8027F}"/>
+              </a:ext>
+            </a:extLst>
+          </p:cNvPr>
+          <p:cNvPicPr>
+            <a:picLocks noChangeAspect="1"/>
+          </p:cNvPicPr>
+          <p:nvPr/>
+        </p:nvPicPr>
+        <p:blipFill>
+          <a:blip r:embed="rId2"/>
+          <a:stretch>
+            <a:fillRect/>
+          </a:stretch>
+        </p:blipFill>
+        <p:spPr>
+          <a:xfrm>
+            <a:off x="1881715" y="576262"/>
+            <a:ext cx="7743825" cy="5705475"/>
+          </a:xfrm>
+          <a:prstGeom prst="rect">
+            <a:avLst/>
+          </a:prstGeom>
+        </p:spPr>
+      </p:pic>
+      <p:sp>
+        <p:nvSpPr>
+          <p:cNvPr id="5" name="Rectangle: Rounded Corners 4">
+            <a:extLst>
+              <a:ext uri="{FF2B5EF4-FFF2-40B4-BE49-F238E27FC236}">
+                <a16:creationId xmlns:a16="http://schemas.microsoft.com/office/drawing/2014/main" id="{E5F43303-F93C-4904-A1AC-0DB0FE15A3C9}"/>
+              </a:ext>
+            </a:extLst>
+          </p:cNvPr>
+          <p:cNvSpPr/>
+          <p:nvPr/>
+        </p:nvSpPr>
+        <p:spPr>
+          <a:xfrm>
+            <a:off x="5730110" y="2939627"/>
+            <a:ext cx="3895430" cy="2293620"/>
+          </a:xfrm>
+          <a:prstGeom prst="roundRect">
+            <a:avLst>
+              <a:gd name="adj" fmla="val 4803"/>
+            </a:avLst>
+          </a:prstGeom>
+          <a:solidFill>
+            <a:schemeClr val="bg1">
+              <a:alpha val="18000"/>
+            </a:schemeClr>
+          </a:solidFill>
+          <a:ln w="38100">
+            <a:solidFill>
+              <a:srgbClr val="F2951A"/>
+            </a:solidFill>
+          </a:ln>
+        </p:spPr>
+        <p:style>
+          <a:lnRef idx="2">
+            <a:schemeClr val="accent1">
+              <a:shade val="50000"/>
+            </a:schemeClr>
+          </a:lnRef>
+          <a:fillRef idx="1">
+            <a:schemeClr val="accent1"/>
+          </a:fillRef>
+          <a:effectRef idx="0">
+            <a:schemeClr val="accent1"/>
+          </a:effectRef>
+          <a:fontRef idx="minor">
+            <a:schemeClr val="lt1"/>
+          </a:fontRef>
+        </p:style>
+        <p:txBody>
+          <a:bodyPr rtlCol="0" anchor="ctr"/>
+          <a:lstStyle/>
+          <a:p>
+            <a:pPr algn="ctr"/>
+            <a:endParaRPr lang="en-SG"/>
+          </a:p>
+        </p:txBody>
+      </p:sp>
+      <p:cxnSp>
+        <p:nvCxnSpPr>
+          <p:cNvPr id="6" name="Straight Arrow Connector 5">
+            <a:extLst>
+              <a:ext uri="{FF2B5EF4-FFF2-40B4-BE49-F238E27FC236}">
+                <a16:creationId xmlns:a16="http://schemas.microsoft.com/office/drawing/2014/main" id="{1BE3BB50-AD44-446A-AD0C-2885482B7E68}"/>
+              </a:ext>
+            </a:extLst>
+          </p:cNvPr>
+          <p:cNvCxnSpPr>
+            <a:cxnSpLocks/>
+          </p:cNvCxnSpPr>
+          <p:nvPr/>
+        </p:nvCxnSpPr>
+        <p:spPr>
+          <a:xfrm>
+            <a:off x="9625540" y="4166447"/>
+            <a:ext cx="276686" cy="0"/>
+          </a:xfrm>
+          <a:prstGeom prst="straightConnector1">
+            <a:avLst/>
+          </a:prstGeom>
+          <a:ln w="38100">
+            <a:solidFill>
+              <a:srgbClr val="F2951A"/>
+            </a:solidFill>
+            <a:tailEnd type="triangle"/>
+          </a:ln>
+        </p:spPr>
+        <p:style>
+          <a:lnRef idx="1">
+            <a:schemeClr val="accent1"/>
+          </a:lnRef>
+          <a:fillRef idx="0">
+            <a:schemeClr val="accent1"/>
+          </a:fillRef>
+          <a:effectRef idx="0">
+            <a:schemeClr val="accent1"/>
+          </a:effectRef>
+          <a:fontRef idx="minor">
+            <a:schemeClr val="tx1"/>
+          </a:fontRef>
+        </p:style>
+      </p:cxnSp>
+      <p:sp>
+        <p:nvSpPr>
+          <p:cNvPr id="7" name="Rectangle: Rounded Corners 6">
+            <a:extLst>
+              <a:ext uri="{FF2B5EF4-FFF2-40B4-BE49-F238E27FC236}">
+                <a16:creationId xmlns:a16="http://schemas.microsoft.com/office/drawing/2014/main" id="{47B6369D-A967-4A61-9DC6-E94A343498C3}"/>
+              </a:ext>
+            </a:extLst>
+          </p:cNvPr>
+          <p:cNvSpPr/>
+          <p:nvPr/>
+        </p:nvSpPr>
+        <p:spPr>
+          <a:xfrm>
+            <a:off x="9954933" y="3832298"/>
+            <a:ext cx="1882787" cy="668298"/>
+          </a:xfrm>
+          <a:prstGeom prst="roundRect">
+            <a:avLst/>
+          </a:prstGeom>
+          <a:solidFill>
+            <a:srgbClr val="F2951A"/>
+          </a:solidFill>
+          <a:ln w="31750">
+            <a:solidFill>
+              <a:srgbClr val="F2951A"/>
+            </a:solidFill>
+          </a:ln>
+        </p:spPr>
+        <p:style>
+          <a:lnRef idx="2">
+            <a:schemeClr val="accent1">
+              <a:shade val="50000"/>
+            </a:schemeClr>
+          </a:lnRef>
+          <a:fillRef idx="1">
+            <a:schemeClr val="accent1"/>
+          </a:fillRef>
+          <a:effectRef idx="0">
+            <a:schemeClr val="accent1"/>
+          </a:effectRef>
+          <a:fontRef idx="minor">
+            <a:schemeClr val="lt1"/>
+          </a:fontRef>
+        </p:style>
+        <p:txBody>
+          <a:bodyPr rtlCol="0" anchor="ctr"/>
+          <a:lstStyle/>
+          <a:p>
+            <a:pPr algn="ctr"/>
+            <a:r>
+              <a:rPr lang="en-SG" dirty="0">
+                <a:latin typeface="Segoe UI" panose="020B0502040204020203" pitchFamily="34" charset="0"/>
+                <a:cs typeface="Segoe UI" panose="020B0502040204020203" pitchFamily="34" charset="0"/>
+              </a:rPr>
+              <a:t>Person Panel</a:t>
+            </a:r>
+          </a:p>
+        </p:txBody>
+      </p:sp>
+    </p:spTree>
+    <p:extLst>
+      <p:ext uri="{BB962C8B-B14F-4D97-AF65-F5344CB8AC3E}">
+        <p14:creationId xmlns:p14="http://schemas.microsoft.com/office/powerpoint/2010/main" val="2803512501"/>
+      </p:ext>
+    </p:extLst>
+  </p:cSld>
+  <p:clrMapOvr>
+    <a:masterClrMapping/>
+  </p:clrMapOvr>
+</p:sld>
+</file>
+
+<file path=ppt/slides/slide29.xml><?xml version="1.0" encoding="utf-8"?>
+<p:sld xmlns:a="http://schemas.openxmlformats.org/drawingml/2006/main" xmlns:r="http://schemas.openxmlformats.org/officeDocument/2006/relationships" xmlns:p="http://schemas.openxmlformats.org/presentationml/2006/main">
+  <p:cSld>
+    <p:spTree>
+      <p:nvGrpSpPr>
+        <p:cNvPr id="1" name=""/>
+        <p:cNvGrpSpPr/>
+        <p:nvPr/>
+      </p:nvGrpSpPr>
+      <p:grpSpPr>
+        <a:xfrm>
+          <a:off x="0" y="0"/>
+          <a:ext cx="0" cy="0"/>
+          <a:chOff x="0" y="0"/>
+          <a:chExt cx="0" cy="0"/>
+        </a:xfrm>
+      </p:grpSpPr>
+      <p:pic>
+        <p:nvPicPr>
+          <p:cNvPr id="4" name="Picture 3">
+            <a:extLst>
+              <a:ext uri="{FF2B5EF4-FFF2-40B4-BE49-F238E27FC236}">
+                <a16:creationId xmlns:a16="http://schemas.microsoft.com/office/drawing/2014/main" id="{5741F3D0-5DD3-4ADA-95E9-808EAAB8027F}"/>
+              </a:ext>
+            </a:extLst>
+          </p:cNvPr>
+          <p:cNvPicPr>
+            <a:picLocks noChangeAspect="1"/>
+          </p:cNvPicPr>
+          <p:nvPr/>
+        </p:nvPicPr>
+        <p:blipFill>
+          <a:blip r:embed="rId2"/>
+          <a:stretch>
+            <a:fillRect/>
+          </a:stretch>
+        </p:blipFill>
+        <p:spPr>
+          <a:xfrm>
+            <a:off x="2965449" y="677862"/>
+            <a:ext cx="7743825" cy="5705475"/>
+          </a:xfrm>
+          <a:prstGeom prst="rect">
+            <a:avLst/>
+          </a:prstGeom>
+        </p:spPr>
+      </p:pic>
+      <p:sp>
+        <p:nvSpPr>
+          <p:cNvPr id="5" name="Rectangle: Rounded Corners 4">
+            <a:extLst>
+              <a:ext uri="{FF2B5EF4-FFF2-40B4-BE49-F238E27FC236}">
+                <a16:creationId xmlns:a16="http://schemas.microsoft.com/office/drawing/2014/main" id="{E5F43303-F93C-4904-A1AC-0DB0FE15A3C9}"/>
+              </a:ext>
+            </a:extLst>
+          </p:cNvPr>
+          <p:cNvSpPr/>
+          <p:nvPr/>
+        </p:nvSpPr>
+        <p:spPr>
+          <a:xfrm>
+            <a:off x="3122378" y="3053503"/>
+            <a:ext cx="3591689" cy="3101763"/>
+          </a:xfrm>
+          <a:prstGeom prst="roundRect">
+            <a:avLst>
+              <a:gd name="adj" fmla="val 4803"/>
+            </a:avLst>
+          </a:prstGeom>
+          <a:solidFill>
+            <a:schemeClr val="bg1">
+              <a:alpha val="18000"/>
+            </a:schemeClr>
+          </a:solidFill>
+          <a:ln w="38100">
+            <a:solidFill>
+              <a:srgbClr val="F2951A"/>
+            </a:solidFill>
+          </a:ln>
+        </p:spPr>
+        <p:style>
+          <a:lnRef idx="2">
+            <a:schemeClr val="accent1">
+              <a:shade val="50000"/>
+            </a:schemeClr>
+          </a:lnRef>
+          <a:fillRef idx="1">
+            <a:schemeClr val="accent1"/>
+          </a:fillRef>
+          <a:effectRef idx="0">
+            <a:schemeClr val="accent1"/>
+          </a:effectRef>
+          <a:fontRef idx="minor">
+            <a:schemeClr val="lt1"/>
+          </a:fontRef>
+        </p:style>
+        <p:txBody>
+          <a:bodyPr rtlCol="0" anchor="ctr"/>
+          <a:lstStyle/>
+          <a:p>
+            <a:pPr algn="ctr"/>
+            <a:endParaRPr lang="en-SG"/>
+          </a:p>
+        </p:txBody>
+      </p:sp>
+      <p:cxnSp>
+        <p:nvCxnSpPr>
+          <p:cNvPr id="6" name="Straight Arrow Connector 5">
+            <a:extLst>
+              <a:ext uri="{FF2B5EF4-FFF2-40B4-BE49-F238E27FC236}">
+                <a16:creationId xmlns:a16="http://schemas.microsoft.com/office/drawing/2014/main" id="{1BE3BB50-AD44-446A-AD0C-2885482B7E68}"/>
+              </a:ext>
+            </a:extLst>
+          </p:cNvPr>
+          <p:cNvCxnSpPr>
+            <a:cxnSpLocks/>
+          </p:cNvCxnSpPr>
+          <p:nvPr/>
+        </p:nvCxnSpPr>
+        <p:spPr>
+          <a:xfrm flipH="1">
+            <a:off x="2805112" y="4225713"/>
+            <a:ext cx="320673" cy="0"/>
+          </a:xfrm>
+          <a:prstGeom prst="straightConnector1">
+            <a:avLst/>
+          </a:prstGeom>
+          <a:ln w="38100">
+            <a:solidFill>
+              <a:srgbClr val="F2951A"/>
+            </a:solidFill>
+            <a:tailEnd type="triangle"/>
+          </a:ln>
+        </p:spPr>
+        <p:style>
+          <a:lnRef idx="1">
+            <a:schemeClr val="accent1"/>
+          </a:lnRef>
+          <a:fillRef idx="0">
+            <a:schemeClr val="accent1"/>
+          </a:fillRef>
+          <a:effectRef idx="0">
+            <a:schemeClr val="accent1"/>
+          </a:effectRef>
+          <a:fontRef idx="minor">
+            <a:schemeClr val="tx1"/>
+          </a:fontRef>
+        </p:style>
+      </p:cxnSp>
+      <p:sp>
+        <p:nvSpPr>
+          <p:cNvPr id="7" name="Rectangle: Rounded Corners 6">
+            <a:extLst>
+              <a:ext uri="{FF2B5EF4-FFF2-40B4-BE49-F238E27FC236}">
+                <a16:creationId xmlns:a16="http://schemas.microsoft.com/office/drawing/2014/main" id="{47B6369D-A967-4A61-9DC6-E94A343498C3}"/>
+              </a:ext>
+            </a:extLst>
+          </p:cNvPr>
+          <p:cNvSpPr/>
+          <p:nvPr/>
+        </p:nvSpPr>
+        <p:spPr>
+          <a:xfrm>
+            <a:off x="922325" y="3891564"/>
+            <a:ext cx="1882787" cy="668298"/>
+          </a:xfrm>
+          <a:prstGeom prst="roundRect">
+            <a:avLst/>
+          </a:prstGeom>
+          <a:solidFill>
+            <a:srgbClr val="F2951A"/>
+          </a:solidFill>
+          <a:ln w="31750">
+            <a:solidFill>
+              <a:srgbClr val="F2951A"/>
+            </a:solidFill>
+          </a:ln>
+        </p:spPr>
+        <p:style>
+          <a:lnRef idx="2">
+            <a:schemeClr val="accent1">
+              <a:shade val="50000"/>
+            </a:schemeClr>
+          </a:lnRef>
+          <a:fillRef idx="1">
+            <a:schemeClr val="accent1"/>
+          </a:fillRef>
+          <a:effectRef idx="0">
+            <a:schemeClr val="accent1"/>
+          </a:effectRef>
+          <a:fontRef idx="minor">
+            <a:schemeClr val="lt1"/>
+          </a:fontRef>
+        </p:style>
+        <p:txBody>
+          <a:bodyPr rtlCol="0" anchor="ctr"/>
+          <a:lstStyle/>
+          <a:p>
+            <a:pPr algn="ctr"/>
+            <a:r>
+              <a:rPr lang="en-SG" dirty="0">
+                <a:latin typeface="Segoe UI" panose="020B0502040204020203" pitchFamily="34" charset="0"/>
+                <a:cs typeface="Segoe UI" panose="020B0502040204020203" pitchFamily="34" charset="0"/>
+              </a:rPr>
+              <a:t>More People Listed</a:t>
+            </a:r>
+          </a:p>
+        </p:txBody>
+      </p:sp>
+    </p:spTree>
+    <p:extLst>
+      <p:ext uri="{BB962C8B-B14F-4D97-AF65-F5344CB8AC3E}">
+        <p14:creationId xmlns:p14="http://schemas.microsoft.com/office/powerpoint/2010/main" val="2874572717"/>
+      </p:ext>
+    </p:extLst>
+  </p:cSld>
+  <p:clrMapOvr>
+    <a:masterClrMapping/>
+  </p:clrMapOvr>
+</p:sld>
+</file>
+
 <file path=ppt/slides/slide3.xml><?xml version="1.0" encoding="utf-8"?>
 <p:sld xmlns:a="http://schemas.openxmlformats.org/drawingml/2006/main" xmlns:r="http://schemas.openxmlformats.org/officeDocument/2006/relationships" xmlns:p="http://schemas.openxmlformats.org/presentationml/2006/main">
   <p:cSld>

</xml_diff>